<commit_message>
adicionando ulimo slide da apresentacao
</commit_message>
<xml_diff>
--- a/RELATÓRIO FINAL E RESUMO/Emílio_apresentação_IC_IT_2023.pptx
+++ b/RELATÓRIO FINAL E RESUMO/Emílio_apresentação_IC_IT_2023.pptx
@@ -16,13 +16,14 @@
     <p:sldId id="264" r:id="rId10"/>
     <p:sldId id="265" r:id="rId11"/>
     <p:sldId id="266" r:id="rId12"/>
-    <p:sldId id="267" r:id="rId13"/>
-    <p:sldId id="268" r:id="rId14"/>
-    <p:sldId id="269" r:id="rId15"/>
-    <p:sldId id="270" r:id="rId16"/>
-    <p:sldId id="271" r:id="rId17"/>
-    <p:sldId id="272" r:id="rId18"/>
-    <p:sldId id="273" r:id="rId19"/>
+    <p:sldId id="274" r:id="rId13"/>
+    <p:sldId id="267" r:id="rId14"/>
+    <p:sldId id="268" r:id="rId15"/>
+    <p:sldId id="269" r:id="rId16"/>
+    <p:sldId id="270" r:id="rId17"/>
+    <p:sldId id="271" r:id="rId18"/>
+    <p:sldId id="272" r:id="rId19"/>
+    <p:sldId id="273" r:id="rId20"/>
   </p:sldIdLst>
   <p:sldSz cx="12192000" cy="6858000"/>
   <p:notesSz cx="6858000" cy="9144000"/>
@@ -141,6 +142,7 @@
             <p14:sldId id="264"/>
             <p14:sldId id="265"/>
             <p14:sldId id="266"/>
+            <p14:sldId id="274"/>
             <p14:sldId id="267"/>
             <p14:sldId id="268"/>
             <p14:sldId id="269"/>
@@ -306,7 +308,7 @@
           <a:p>
             <a:fld id="{8D25F45D-8F72-4D9D-B104-E99A08C325C4}" type="datetimeFigureOut">
               <a:rPr lang="pt-BR" smtClean="0"/>
-              <a:t>01/10/2023</a:t>
+              <a:t>17/10/2023</a:t>
             </a:fld>
             <a:endParaRPr lang="pt-BR"/>
           </a:p>
@@ -504,7 +506,7 @@
           <a:p>
             <a:fld id="{8D25F45D-8F72-4D9D-B104-E99A08C325C4}" type="datetimeFigureOut">
               <a:rPr lang="pt-BR" smtClean="0"/>
-              <a:t>01/10/2023</a:t>
+              <a:t>17/10/2023</a:t>
             </a:fld>
             <a:endParaRPr lang="pt-BR"/>
           </a:p>
@@ -712,7 +714,7 @@
           <a:p>
             <a:fld id="{8D25F45D-8F72-4D9D-B104-E99A08C325C4}" type="datetimeFigureOut">
               <a:rPr lang="pt-BR" smtClean="0"/>
-              <a:t>01/10/2023</a:t>
+              <a:t>17/10/2023</a:t>
             </a:fld>
             <a:endParaRPr lang="pt-BR"/>
           </a:p>
@@ -910,7 +912,7 @@
           <a:p>
             <a:fld id="{8D25F45D-8F72-4D9D-B104-E99A08C325C4}" type="datetimeFigureOut">
               <a:rPr lang="pt-BR" smtClean="0"/>
-              <a:t>01/10/2023</a:t>
+              <a:t>17/10/2023</a:t>
             </a:fld>
             <a:endParaRPr lang="pt-BR"/>
           </a:p>
@@ -1185,7 +1187,7 @@
           <a:p>
             <a:fld id="{8D25F45D-8F72-4D9D-B104-E99A08C325C4}" type="datetimeFigureOut">
               <a:rPr lang="pt-BR" smtClean="0"/>
-              <a:t>01/10/2023</a:t>
+              <a:t>17/10/2023</a:t>
             </a:fld>
             <a:endParaRPr lang="pt-BR"/>
           </a:p>
@@ -1450,7 +1452,7 @@
           <a:p>
             <a:fld id="{8D25F45D-8F72-4D9D-B104-E99A08C325C4}" type="datetimeFigureOut">
               <a:rPr lang="pt-BR" smtClean="0"/>
-              <a:t>01/10/2023</a:t>
+              <a:t>17/10/2023</a:t>
             </a:fld>
             <a:endParaRPr lang="pt-BR"/>
           </a:p>
@@ -1862,7 +1864,7 @@
           <a:p>
             <a:fld id="{8D25F45D-8F72-4D9D-B104-E99A08C325C4}" type="datetimeFigureOut">
               <a:rPr lang="pt-BR" smtClean="0"/>
-              <a:t>01/10/2023</a:t>
+              <a:t>17/10/2023</a:t>
             </a:fld>
             <a:endParaRPr lang="pt-BR"/>
           </a:p>
@@ -2003,7 +2005,7 @@
           <a:p>
             <a:fld id="{8D25F45D-8F72-4D9D-B104-E99A08C325C4}" type="datetimeFigureOut">
               <a:rPr lang="pt-BR" smtClean="0"/>
-              <a:t>01/10/2023</a:t>
+              <a:t>17/10/2023</a:t>
             </a:fld>
             <a:endParaRPr lang="pt-BR"/>
           </a:p>
@@ -2116,7 +2118,7 @@
           <a:p>
             <a:fld id="{8D25F45D-8F72-4D9D-B104-E99A08C325C4}" type="datetimeFigureOut">
               <a:rPr lang="pt-BR" smtClean="0"/>
-              <a:t>01/10/2023</a:t>
+              <a:t>17/10/2023</a:t>
             </a:fld>
             <a:endParaRPr lang="pt-BR"/>
           </a:p>
@@ -2427,7 +2429,7 @@
           <a:p>
             <a:fld id="{8D25F45D-8F72-4D9D-B104-E99A08C325C4}" type="datetimeFigureOut">
               <a:rPr lang="pt-BR" smtClean="0"/>
-              <a:t>01/10/2023</a:t>
+              <a:t>17/10/2023</a:t>
             </a:fld>
             <a:endParaRPr lang="pt-BR"/>
           </a:p>
@@ -2715,7 +2717,7 @@
           <a:p>
             <a:fld id="{8D25F45D-8F72-4D9D-B104-E99A08C325C4}" type="datetimeFigureOut">
               <a:rPr lang="pt-BR" smtClean="0"/>
-              <a:t>01/10/2023</a:t>
+              <a:t>17/10/2023</a:t>
             </a:fld>
             <a:endParaRPr lang="pt-BR"/>
           </a:p>
@@ -2956,7 +2958,7 @@
           <a:p>
             <a:fld id="{8D25F45D-8F72-4D9D-B104-E99A08C325C4}" type="datetimeFigureOut">
               <a:rPr lang="pt-BR" smtClean="0"/>
-              <a:t>01/10/2023</a:t>
+              <a:t>17/10/2023</a:t>
             </a:fld>
             <a:endParaRPr lang="pt-BR"/>
           </a:p>
@@ -4721,7 +4723,7 @@
           </a:ln>
           <a:extLst>
             <a:ext uri="{C572A759-6A51-4108-AA02-DFA0A04FC94B}">
-              <ma14:wrappingTextBoxFlag xmlns:ma14="http://schemas.microsoft.com/office/mac/drawingml/2011/main" xmlns:a14="http://schemas.microsoft.com/office/drawing/2010/main" xmlns:m="http://schemas.openxmlformats.org/officeDocument/2006/math" xmlns="" val="1"/>
+              <ma14:wrappingTextBoxFlag xmlns="" xmlns:m="http://schemas.openxmlformats.org/officeDocument/2006/math" xmlns:a14="http://schemas.microsoft.com/office/drawing/2010/main" xmlns:ma14="http://schemas.microsoft.com/office/mac/drawingml/2011/main" val="1"/>
             </a:ext>
           </a:extLst>
         </p:spPr>
@@ -5145,47 +5147,10 @@
       </p:pic>
       <p:sp>
         <p:nvSpPr>
-          <p:cNvPr id="4" name="Google Shape;189;g14c9cf1f4b7_0_11">
-            <a:extLst>
-              <a:ext uri="{FF2B5EF4-FFF2-40B4-BE49-F238E27FC236}">
-                <a16:creationId xmlns:a16="http://schemas.microsoft.com/office/drawing/2014/main" id="{8DE52A6A-2E9B-6AB4-6A53-E5CBE81C2EA1}"/>
-              </a:ext>
-            </a:extLst>
-          </p:cNvPr>
-          <p:cNvSpPr txBox="1">
-            <a:spLocks noGrp="1"/>
-          </p:cNvSpPr>
-          <p:nvPr>
-            <p:ph type="title"/>
-          </p:nvPr>
-        </p:nvSpPr>
-        <p:spPr>
-          <a:xfrm>
-            <a:off x="2976476" y="523750"/>
-            <a:ext cx="8780700" cy="1325700"/>
-          </a:xfrm>
-          <a:prstGeom prst="rect">
-            <a:avLst/>
-          </a:prstGeom>
-        </p:spPr>
-        <p:txBody>
-          <a:bodyPr/>
-          <a:lstStyle/>
-          <a:p>
-            <a:r>
-              <a:rPr dirty="0" err="1"/>
-              <a:t>Conclusão</a:t>
-            </a:r>
-            <a:endParaRPr dirty="0"/>
-          </a:p>
-        </p:txBody>
-      </p:sp>
-      <p:sp>
-        <p:nvSpPr>
-          <p:cNvPr id="5" name="Google Shape;190;g14c9cf1f4b7_0_11">
-            <a:extLst>
-              <a:ext uri="{FF2B5EF4-FFF2-40B4-BE49-F238E27FC236}">
-                <a16:creationId xmlns:a16="http://schemas.microsoft.com/office/drawing/2014/main" id="{8A5A5DE1-2FD8-8974-C777-18F00C95E79F}"/>
+          <p:cNvPr id="10" name="Google Shape;170;g16475793bdd_0_102">
+            <a:extLst>
+              <a:ext uri="{FF2B5EF4-FFF2-40B4-BE49-F238E27FC236}">
+                <a16:creationId xmlns:a16="http://schemas.microsoft.com/office/drawing/2014/main" id="{604572AC-AE36-9E4A-15E4-DAB345225747}"/>
               </a:ext>
             </a:extLst>
           </p:cNvPr>
@@ -5196,218 +5161,150 @@
         </p:nvSpPr>
         <p:spPr>
           <a:xfrm>
-            <a:off x="2976475" y="2000399"/>
-            <a:ext cx="8627100" cy="4857601"/>
+            <a:off x="2976476" y="523750"/>
+            <a:ext cx="8780700" cy="1325700"/>
           </a:xfrm>
           <a:prstGeom prst="rect">
             <a:avLst/>
           </a:prstGeom>
         </p:spPr>
         <p:txBody>
-          <a:bodyPr vert="horz" lIns="91440" tIns="45720" rIns="91440" bIns="45720" rtlCol="0">
+          <a:bodyPr vert="horz" lIns="91440" tIns="45720" rIns="91440" bIns="45720" rtlCol="0" anchor="ctr">
             <a:normAutofit/>
           </a:bodyPr>
           <a:lstStyle>
-            <a:lvl1pPr marL="228600" indent="-228600" algn="l" defTabSz="914400" rtl="0" eaLnBrk="1" latinLnBrk="0" hangingPunct="1">
+            <a:lvl1pPr algn="l" defTabSz="914400" rtl="0" eaLnBrk="1" latinLnBrk="0" hangingPunct="1">
               <a:lnSpc>
                 <a:spcPct val="90000"/>
               </a:lnSpc>
               <a:spcBef>
+                <a:spcPct val="0"/>
+              </a:spcBef>
+              <a:buNone/>
+              <a:defRPr sz="4400" kern="1200">
+                <a:solidFill>
+                  <a:schemeClr val="tx1"/>
+                </a:solidFill>
+                <a:latin typeface="+mj-lt"/>
+                <a:ea typeface="+mj-ea"/>
+                <a:cs typeface="+mj-cs"/>
+              </a:defRPr>
+            </a:lvl1pPr>
+          </a:lstStyle>
+          <a:p>
+            <a:r>
+              <a:rPr lang="pt-BR" dirty="0"/>
+              <a:t>Bacias Hidrográficas Inteligentes e Sustentáveis</a:t>
+            </a:r>
+          </a:p>
+        </p:txBody>
+      </p:sp>
+      <p:sp>
+        <p:nvSpPr>
+          <p:cNvPr id="3" name="Google Shape;171;g16475793bdd_0_102">
+            <a:extLst>
+              <a:ext uri="{FF2B5EF4-FFF2-40B4-BE49-F238E27FC236}">
+                <a16:creationId xmlns:a16="http://schemas.microsoft.com/office/drawing/2014/main" id="{3914BBF3-161C-9136-DF7F-2D4AD34B9EFD}"/>
+              </a:ext>
+            </a:extLst>
+          </p:cNvPr>
+          <p:cNvSpPr txBox="1"/>
+          <p:nvPr/>
+        </p:nvSpPr>
+        <p:spPr>
+          <a:xfrm>
+            <a:off x="2976476" y="2289044"/>
+            <a:ext cx="8377202" cy="4351201"/>
+          </a:xfrm>
+          <a:prstGeom prst="rect">
+            <a:avLst/>
+          </a:prstGeom>
+          <a:ln w="12700">
+            <a:miter lim="400000"/>
+          </a:ln>
+          <a:extLst>
+            <a:ext uri="{C572A759-6A51-4108-AA02-DFA0A04FC94B}">
+              <ma14:wrappingTextBoxFlag xmlns:ma14="http://schemas.microsoft.com/office/mac/drawingml/2011/main" xmlns:a14="http://schemas.microsoft.com/office/drawing/2010/main" xmlns:m="http://schemas.openxmlformats.org/officeDocument/2006/math" xmlns="" val="1"/>
+            </a:ext>
+          </a:extLst>
+        </p:spPr>
+        <p:txBody>
+          <a:bodyPr lIns="45699" tIns="45699" rIns="45699" bIns="45699">
+            <a:normAutofit/>
+          </a:bodyPr>
+          <a:lstStyle/>
+          <a:p>
+            <a:pPr marL="457200" indent="-342900">
+              <a:lnSpc>
+                <a:spcPct val="90000"/>
+              </a:lnSpc>
+              <a:spcBef>
                 <a:spcPts val="1000"/>
               </a:spcBef>
-              <a:buFont typeface="Arial" panose="020B0604020202020204" pitchFamily="34" charset="0"/>
+              <a:buClr>
+                <a:srgbClr val="000000"/>
+              </a:buClr>
+              <a:buSzPts val="2800"/>
+              <a:buFont typeface="Arial"/>
               <a:buChar char="•"/>
-              <a:defRPr sz="2800" kern="1200">
-                <a:solidFill>
-                  <a:schemeClr val="tx1"/>
-                </a:solidFill>
-                <a:latin typeface="+mn-lt"/>
-                <a:ea typeface="+mn-ea"/>
-                <a:cs typeface="+mn-cs"/>
-              </a:defRPr>
-            </a:lvl1pPr>
-            <a:lvl2pPr marL="685800" indent="-228600" algn="l" defTabSz="914400" rtl="0" eaLnBrk="1" latinLnBrk="0" hangingPunct="1">
+              <a:defRPr sz="2800">
+                <a:latin typeface="Calibri"/>
+                <a:ea typeface="Calibri"/>
+                <a:cs typeface="Calibri"/>
+                <a:sym typeface="Calibri"/>
+              </a:defRPr>
+            </a:pPr>
+            <a:r>
+              <a:rPr lang="pt-BR" dirty="0"/>
+              <a:t>Proposta: Centro Integrado de Monitoramento de Recursos Hídricos (CIMRC).</a:t>
+            </a:r>
+          </a:p>
+          <a:p>
+            <a:pPr marL="914400" lvl="1" indent="-342900">
               <a:lnSpc>
                 <a:spcPct val="90000"/>
               </a:lnSpc>
               <a:spcBef>
-                <a:spcPts val="500"/>
-              </a:spcBef>
-              <a:buFont typeface="Arial" panose="020B0604020202020204" pitchFamily="34" charset="0"/>
+                <a:spcPts val="1000"/>
+              </a:spcBef>
+              <a:buClr>
+                <a:srgbClr val="000000"/>
+              </a:buClr>
+              <a:buSzPts val="2800"/>
+              <a:buFont typeface="Arial"/>
               <a:buChar char="•"/>
-              <a:defRPr sz="2400" kern="1200">
-                <a:solidFill>
-                  <a:schemeClr val="tx1"/>
-                </a:solidFill>
-                <a:latin typeface="+mn-lt"/>
-                <a:ea typeface="+mn-ea"/>
-                <a:cs typeface="+mn-cs"/>
-              </a:defRPr>
-            </a:lvl2pPr>
-            <a:lvl3pPr marL="1143000" indent="-228600" algn="l" defTabSz="914400" rtl="0" eaLnBrk="1" latinLnBrk="0" hangingPunct="1">
-              <a:lnSpc>
-                <a:spcPct val="90000"/>
-              </a:lnSpc>
-              <a:spcBef>
-                <a:spcPts val="500"/>
-              </a:spcBef>
-              <a:buFont typeface="Arial" panose="020B0604020202020204" pitchFamily="34" charset="0"/>
-              <a:buChar char="•"/>
-              <a:defRPr sz="2000" kern="1200">
-                <a:solidFill>
-                  <a:schemeClr val="tx1"/>
-                </a:solidFill>
-                <a:latin typeface="+mn-lt"/>
-                <a:ea typeface="+mn-ea"/>
-                <a:cs typeface="+mn-cs"/>
-              </a:defRPr>
-            </a:lvl3pPr>
-            <a:lvl4pPr marL="1600200" indent="-228600" algn="l" defTabSz="914400" rtl="0" eaLnBrk="1" latinLnBrk="0" hangingPunct="1">
-              <a:lnSpc>
-                <a:spcPct val="90000"/>
-              </a:lnSpc>
-              <a:spcBef>
-                <a:spcPts val="500"/>
-              </a:spcBef>
-              <a:buFont typeface="Arial" panose="020B0604020202020204" pitchFamily="34" charset="0"/>
-              <a:buChar char="•"/>
-              <a:defRPr sz="1800" kern="1200">
-                <a:solidFill>
-                  <a:schemeClr val="tx1"/>
-                </a:solidFill>
-                <a:latin typeface="+mn-lt"/>
-                <a:ea typeface="+mn-ea"/>
-                <a:cs typeface="+mn-cs"/>
-              </a:defRPr>
-            </a:lvl4pPr>
-            <a:lvl5pPr marL="2057400" indent="-228600" algn="l" defTabSz="914400" rtl="0" eaLnBrk="1" latinLnBrk="0" hangingPunct="1">
-              <a:lnSpc>
-                <a:spcPct val="90000"/>
-              </a:lnSpc>
-              <a:spcBef>
-                <a:spcPts val="500"/>
-              </a:spcBef>
-              <a:buFont typeface="Arial" panose="020B0604020202020204" pitchFamily="34" charset="0"/>
-              <a:buChar char="•"/>
-              <a:defRPr sz="1800" kern="1200">
-                <a:solidFill>
-                  <a:schemeClr val="tx1"/>
-                </a:solidFill>
-                <a:latin typeface="+mn-lt"/>
-                <a:ea typeface="+mn-ea"/>
-                <a:cs typeface="+mn-cs"/>
-              </a:defRPr>
-            </a:lvl5pPr>
-            <a:lvl6pPr marL="2514600" indent="-228600" algn="l" defTabSz="914400" rtl="0" eaLnBrk="1" latinLnBrk="0" hangingPunct="1">
-              <a:lnSpc>
-                <a:spcPct val="90000"/>
-              </a:lnSpc>
-              <a:spcBef>
-                <a:spcPts val="500"/>
-              </a:spcBef>
-              <a:buFont typeface="Arial" panose="020B0604020202020204" pitchFamily="34" charset="0"/>
-              <a:buChar char="•"/>
-              <a:defRPr sz="1800" kern="1200">
-                <a:solidFill>
-                  <a:schemeClr val="tx1"/>
-                </a:solidFill>
-                <a:latin typeface="+mn-lt"/>
-                <a:ea typeface="+mn-ea"/>
-                <a:cs typeface="+mn-cs"/>
-              </a:defRPr>
-            </a:lvl6pPr>
-            <a:lvl7pPr marL="2971800" indent="-228600" algn="l" defTabSz="914400" rtl="0" eaLnBrk="1" latinLnBrk="0" hangingPunct="1">
-              <a:lnSpc>
-                <a:spcPct val="90000"/>
-              </a:lnSpc>
-              <a:spcBef>
-                <a:spcPts val="500"/>
-              </a:spcBef>
-              <a:buFont typeface="Arial" panose="020B0604020202020204" pitchFamily="34" charset="0"/>
-              <a:buChar char="•"/>
-              <a:defRPr sz="1800" kern="1200">
-                <a:solidFill>
-                  <a:schemeClr val="tx1"/>
-                </a:solidFill>
-                <a:latin typeface="+mn-lt"/>
-                <a:ea typeface="+mn-ea"/>
-                <a:cs typeface="+mn-cs"/>
-              </a:defRPr>
-            </a:lvl7pPr>
-            <a:lvl8pPr marL="3429000" indent="-228600" algn="l" defTabSz="914400" rtl="0" eaLnBrk="1" latinLnBrk="0" hangingPunct="1">
-              <a:lnSpc>
-                <a:spcPct val="90000"/>
-              </a:lnSpc>
-              <a:spcBef>
-                <a:spcPts val="500"/>
-              </a:spcBef>
-              <a:buFont typeface="Arial" panose="020B0604020202020204" pitchFamily="34" charset="0"/>
-              <a:buChar char="•"/>
-              <a:defRPr sz="1800" kern="1200">
-                <a:solidFill>
-                  <a:schemeClr val="tx1"/>
-                </a:solidFill>
-                <a:latin typeface="+mn-lt"/>
-                <a:ea typeface="+mn-ea"/>
-                <a:cs typeface="+mn-cs"/>
-              </a:defRPr>
-            </a:lvl8pPr>
-            <a:lvl9pPr marL="3886200" indent="-228600" algn="l" defTabSz="914400" rtl="0" eaLnBrk="1" latinLnBrk="0" hangingPunct="1">
-              <a:lnSpc>
-                <a:spcPct val="90000"/>
-              </a:lnSpc>
-              <a:spcBef>
-                <a:spcPts val="500"/>
-              </a:spcBef>
-              <a:buFont typeface="Arial" panose="020B0604020202020204" pitchFamily="34" charset="0"/>
-              <a:buChar char="•"/>
-              <a:defRPr sz="1800" kern="1200">
-                <a:solidFill>
-                  <a:schemeClr val="tx1"/>
-                </a:solidFill>
-                <a:latin typeface="+mn-lt"/>
-                <a:ea typeface="+mn-ea"/>
-                <a:cs typeface="+mn-cs"/>
-              </a:defRPr>
-            </a:lvl9pPr>
-          </a:lstStyle>
-          <a:p>
-            <a:pPr marL="0" indent="457200">
-              <a:lnSpc>
-                <a:spcPct val="200000"/>
-              </a:lnSpc>
-              <a:spcBef>
-                <a:spcPts val="0"/>
-              </a:spcBef>
-              <a:buFont typeface="Arial" panose="020B0604020202020204" pitchFamily="34" charset="0"/>
-              <a:buNone/>
-              <a:defRPr sz="1800"/>
+              <a:defRPr sz="2800">
+                <a:latin typeface="Calibri"/>
+                <a:ea typeface="Calibri"/>
+                <a:cs typeface="Calibri"/>
+                <a:sym typeface="Calibri"/>
+              </a:defRPr>
             </a:pPr>
             <a:r>
-              <a:rPr lang="pt-BR" sz="1800"/>
-              <a:t>O estudo se propôs a explorar o uso de TICs para desenvolver o conceito de bacias hidrográficas inteligentes e sustentáveis</a:t>
-            </a:r>
-            <a:r>
-              <a:rPr lang="pt-BR" sz="1200">
-                <a:latin typeface="Times Roman"/>
-                <a:ea typeface="Times Roman"/>
-                <a:cs typeface="Times Roman"/>
-                <a:sym typeface="Times Roman"/>
-              </a:rPr>
-              <a:t>. </a:t>
-            </a:r>
-            <a:r>
-              <a:rPr lang="pt-BR" sz="1800"/>
-              <a:t>Baseando-se em conceitos e aplicações de cidades inteligentes, enfatizou-se a importância das TICs para a melhoria da qualidade de vida.</a:t>
-            </a:r>
-            <a:endParaRPr lang="pt-BR" sz="1800" dirty="0"/>
+              <a:rPr lang="pt-BR" dirty="0"/>
+              <a:t>Recebe informações coletadas dos espaços territoriais das bacias hidrográficas (aplicações de </a:t>
+            </a:r>
+            <a:r>
+              <a:rPr lang="pt-BR" dirty="0" err="1"/>
+              <a:t>IoT</a:t>
+            </a:r>
+            <a:r>
+              <a:rPr lang="pt-BR" dirty="0"/>
+              <a:t>) e processá-las, gerando subsídios para facilitar o processo de tomada de decisão da gestão dos recursos hídricos (aplicações de Big Data e Inteligência Artificial). </a:t>
+            </a:r>
+            <a:endParaRPr lang="pt-BR" sz="1200" dirty="0">
+              <a:latin typeface="Times Roman"/>
+              <a:ea typeface="Times Roman"/>
+              <a:cs typeface="Times Roman"/>
+              <a:sym typeface="Times Roman"/>
+            </a:endParaRPr>
           </a:p>
         </p:txBody>
       </p:sp>
     </p:spTree>
     <p:extLst>
       <p:ext uri="{BB962C8B-B14F-4D97-AF65-F5344CB8AC3E}">
-        <p14:creationId xmlns:p14="http://schemas.microsoft.com/office/powerpoint/2010/main" val="1970430346"/>
+        <p14:creationId xmlns:p14="http://schemas.microsoft.com/office/powerpoint/2010/main" val="3365559693"/>
       </p:ext>
     </p:extLst>
   </p:cSld>
@@ -5633,10 +5530,10 @@
       </p:sp>
       <p:sp>
         <p:nvSpPr>
-          <p:cNvPr id="3" name="Google Shape;196;g16475793bdd_0_121">
-            <a:extLst>
-              <a:ext uri="{FF2B5EF4-FFF2-40B4-BE49-F238E27FC236}">
-                <a16:creationId xmlns:a16="http://schemas.microsoft.com/office/drawing/2014/main" id="{56366834-EE77-0DEA-40B6-4AF1DF33C3BC}"/>
+          <p:cNvPr id="5" name="Google Shape;190;g14c9cf1f4b7_0_11">
+            <a:extLst>
+              <a:ext uri="{FF2B5EF4-FFF2-40B4-BE49-F238E27FC236}">
+                <a16:creationId xmlns:a16="http://schemas.microsoft.com/office/drawing/2014/main" id="{8A5A5DE1-2FD8-8974-C777-18F00C95E79F}"/>
               </a:ext>
             </a:extLst>
           </p:cNvPr>
@@ -5836,7 +5733,7 @@
             </a:pPr>
             <a:r>
               <a:rPr lang="pt-BR" sz="1800"/>
-              <a:t>A criação de um Centro Integrado de Monitoramento de Recursos Hídricos (CIMRC) foi proposta para centralizar informações relacionadas à segurança hídrica da região da bacia hidrográfica. A combinação de IoT, Computação em Nuvem, Big Data e Inteligência Artificial seria utilizada para alcançar eficiência na gestão hídrica.</a:t>
+              <a:t>O estudo se propôs a explorar o uso de TICs para desenvolver o conceito de bacias hidrográficas inteligentes e sustentáveis</a:t>
             </a:r>
             <a:r>
               <a:rPr lang="pt-BR" sz="1200">
@@ -5845,34 +5742,20 @@
                 <a:cs typeface="Times Roman"/>
                 <a:sym typeface="Times Roman"/>
               </a:rPr>
-              <a:t> </a:t>
+              <a:t>. </a:t>
             </a:r>
             <a:r>
               <a:rPr lang="pt-BR" sz="1800"/>
-              <a:t> Esse centro automatizado utilizaria recursos como sensores e dados climáticos para melhorar a gestão dos recursos hídricos, permitindo análises e subsídios para tomadas de decisões eficazes em tempo real.</a:t>
-            </a:r>
-            <a:r>
-              <a:rPr lang="pt-BR" sz="1200">
-                <a:latin typeface="Times Roman"/>
-                <a:ea typeface="Times Roman"/>
-                <a:cs typeface="Times Roman"/>
-                <a:sym typeface="Times Roman"/>
-              </a:rPr>
-              <a:t> </a:t>
-            </a:r>
-            <a:endParaRPr lang="pt-BR" sz="1200" dirty="0">
-              <a:latin typeface="Times Roman"/>
-              <a:ea typeface="Times Roman"/>
-              <a:cs typeface="Times Roman"/>
-              <a:sym typeface="Times Roman"/>
-            </a:endParaRPr>
+              <a:t>Baseando-se em conceitos e aplicações de cidades inteligentes, enfatizou-se a importância das TICs para a melhoria da qualidade de vida.</a:t>
+            </a:r>
+            <a:endParaRPr lang="pt-BR" sz="1800" dirty="0"/>
           </a:p>
         </p:txBody>
       </p:sp>
     </p:spTree>
     <p:extLst>
       <p:ext uri="{BB962C8B-B14F-4D97-AF65-F5344CB8AC3E}">
-        <p14:creationId xmlns:p14="http://schemas.microsoft.com/office/powerpoint/2010/main" val="1336780418"/>
+        <p14:creationId xmlns:p14="http://schemas.microsoft.com/office/powerpoint/2010/main" val="1970430346"/>
       </p:ext>
     </p:extLst>
   </p:cSld>
@@ -6061,10 +5944,47 @@
       </p:pic>
       <p:sp>
         <p:nvSpPr>
-          <p:cNvPr id="10" name="Google Shape;201;g16475793bdd_0_111">
-            <a:extLst>
-              <a:ext uri="{FF2B5EF4-FFF2-40B4-BE49-F238E27FC236}">
-                <a16:creationId xmlns:a16="http://schemas.microsoft.com/office/drawing/2014/main" id="{69053C15-31BA-02F8-CF57-D8D9AC5CE48E}"/>
+          <p:cNvPr id="4" name="Google Shape;189;g14c9cf1f4b7_0_11">
+            <a:extLst>
+              <a:ext uri="{FF2B5EF4-FFF2-40B4-BE49-F238E27FC236}">
+                <a16:creationId xmlns:a16="http://schemas.microsoft.com/office/drawing/2014/main" id="{8DE52A6A-2E9B-6AB4-6A53-E5CBE81C2EA1}"/>
+              </a:ext>
+            </a:extLst>
+          </p:cNvPr>
+          <p:cNvSpPr txBox="1">
+            <a:spLocks noGrp="1"/>
+          </p:cNvSpPr>
+          <p:nvPr>
+            <p:ph type="title"/>
+          </p:nvPr>
+        </p:nvSpPr>
+        <p:spPr>
+          <a:xfrm>
+            <a:off x="2976476" y="523750"/>
+            <a:ext cx="8780700" cy="1325700"/>
+          </a:xfrm>
+          <a:prstGeom prst="rect">
+            <a:avLst/>
+          </a:prstGeom>
+        </p:spPr>
+        <p:txBody>
+          <a:bodyPr/>
+          <a:lstStyle/>
+          <a:p>
+            <a:r>
+              <a:rPr dirty="0" err="1"/>
+              <a:t>Conclusão</a:t>
+            </a:r>
+            <a:endParaRPr dirty="0"/>
+          </a:p>
+        </p:txBody>
+      </p:sp>
+      <p:sp>
+        <p:nvSpPr>
+          <p:cNvPr id="3" name="Google Shape;196;g16475793bdd_0_121">
+            <a:extLst>
+              <a:ext uri="{FF2B5EF4-FFF2-40B4-BE49-F238E27FC236}">
+                <a16:creationId xmlns:a16="http://schemas.microsoft.com/office/drawing/2014/main" id="{56366834-EE77-0DEA-40B6-4AF1DF33C3BC}"/>
               </a:ext>
             </a:extLst>
           </p:cNvPr>
@@ -6075,63 +5995,8 @@
         </p:nvSpPr>
         <p:spPr>
           <a:xfrm>
-            <a:off x="2976476" y="523750"/>
-            <a:ext cx="8780700" cy="1325700"/>
-          </a:xfrm>
-          <a:prstGeom prst="rect">
-            <a:avLst/>
-          </a:prstGeom>
-        </p:spPr>
-        <p:txBody>
-          <a:bodyPr vert="horz" lIns="91440" tIns="45720" rIns="91440" bIns="45720" rtlCol="0" anchor="ctr">
-            <a:normAutofit/>
-          </a:bodyPr>
-          <a:lstStyle>
-            <a:lvl1pPr algn="l" defTabSz="914400" rtl="0" eaLnBrk="1" latinLnBrk="0" hangingPunct="1">
-              <a:lnSpc>
-                <a:spcPct val="90000"/>
-              </a:lnSpc>
-              <a:spcBef>
-                <a:spcPct val="0"/>
-              </a:spcBef>
-              <a:buNone/>
-              <a:defRPr sz="4400" kern="1200">
-                <a:solidFill>
-                  <a:schemeClr val="tx1"/>
-                </a:solidFill>
-                <a:latin typeface="+mj-lt"/>
-                <a:ea typeface="+mj-ea"/>
-                <a:cs typeface="+mj-cs"/>
-              </a:defRPr>
-            </a:lvl1pPr>
-          </a:lstStyle>
-          <a:p>
-            <a:r>
-              <a:rPr lang="pt-BR"/>
-              <a:t>Agradecimento</a:t>
-            </a:r>
-            <a:endParaRPr lang="pt-BR" dirty="0"/>
-          </a:p>
-        </p:txBody>
-      </p:sp>
-      <p:sp>
-        <p:nvSpPr>
-          <p:cNvPr id="11" name="Google Shape;202;g16475793bdd_0_111">
-            <a:extLst>
-              <a:ext uri="{FF2B5EF4-FFF2-40B4-BE49-F238E27FC236}">
-                <a16:creationId xmlns:a16="http://schemas.microsoft.com/office/drawing/2014/main" id="{68DCAF01-ACF5-F545-D82C-EA607C826329}"/>
-              </a:ext>
-            </a:extLst>
-          </p:cNvPr>
-          <p:cNvSpPr txBox="1">
-            <a:spLocks/>
-          </p:cNvSpPr>
-          <p:nvPr/>
-        </p:nvSpPr>
-        <p:spPr>
-          <a:xfrm>
-            <a:off x="2976474" y="2136650"/>
-            <a:ext cx="8370901" cy="4857601"/>
+            <a:off x="2976475" y="2000399"/>
+            <a:ext cx="8627100" cy="4857601"/>
           </a:xfrm>
           <a:prstGeom prst="rect">
             <a:avLst/>
@@ -6142,17 +6007,16 @@
             <a:normAutofit/>
           </a:bodyPr>
           <a:lstStyle>
-            <a:lvl1pPr marL="0" indent="457200" algn="l" defTabSz="914400" rtl="0" eaLnBrk="1" latinLnBrk="0" hangingPunct="1">
-              <a:lnSpc>
-                <a:spcPct val="200000"/>
-              </a:lnSpc>
-              <a:spcBef>
-                <a:spcPts val="0"/>
-              </a:spcBef>
-              <a:buSzTx/>
+            <a:lvl1pPr marL="228600" indent="-228600" algn="l" defTabSz="914400" rtl="0" eaLnBrk="1" latinLnBrk="0" hangingPunct="1">
+              <a:lnSpc>
+                <a:spcPct val="90000"/>
+              </a:lnSpc>
+              <a:spcBef>
+                <a:spcPts val="1000"/>
+              </a:spcBef>
               <a:buFont typeface="Arial" panose="020B0604020202020204" pitchFamily="34" charset="0"/>
-              <a:buNone/>
-              <a:defRPr sz="1800" kern="1200">
+              <a:buChar char="•"/>
+              <a:defRPr sz="2800" kern="1200">
                 <a:solidFill>
                   <a:schemeClr val="tx1"/>
                 </a:solidFill>
@@ -6307,15 +6171,48 @@
             </a:lvl9pPr>
           </a:lstStyle>
           <a:p>
-            <a:r>
-              <a:rPr lang="pt-BR"/>
-              <a:t>Os autores agradecem ao CNPq e à Pontifícia Universidade Católica de Campinas pela oportunidade e incentivo de desenvolver pesquisa no país e pela bolsa PIBIC recebida.</a:t>
+            <a:pPr marL="0" indent="457200">
+              <a:lnSpc>
+                <a:spcPct val="200000"/>
+              </a:lnSpc>
+              <a:spcBef>
+                <a:spcPts val="0"/>
+              </a:spcBef>
+              <a:buFont typeface="Arial" panose="020B0604020202020204" pitchFamily="34" charset="0"/>
+              <a:buNone/>
+              <a:defRPr sz="1800"/>
+            </a:pPr>
+            <a:r>
+              <a:rPr lang="pt-BR" sz="1800"/>
+              <a:t>A criação de um Centro Integrado de Monitoramento de Recursos Hídricos (CIMRC) foi proposta para centralizar informações relacionadas à segurança hídrica da região da bacia hidrográfica. A combinação de IoT, Computação em Nuvem, Big Data e Inteligência Artificial seria utilizada para alcançar eficiência na gestão hídrica.</a:t>
+            </a:r>
+            <a:r>
+              <a:rPr lang="pt-BR" sz="1200">
+                <a:latin typeface="Times Roman"/>
+                <a:ea typeface="Times Roman"/>
+                <a:cs typeface="Times Roman"/>
+                <a:sym typeface="Times Roman"/>
+              </a:rPr>
+              <a:t> </a:t>
+            </a:r>
+            <a:r>
+              <a:rPr lang="pt-BR" sz="1800"/>
+              <a:t> Esse centro automatizado utilizaria recursos como sensores e dados climáticos para melhorar a gestão dos recursos hídricos, permitindo análises e subsídios para tomadas de decisões eficazes em tempo real.</a:t>
+            </a:r>
+            <a:r>
+              <a:rPr lang="pt-BR" sz="1200">
+                <a:latin typeface="Times Roman"/>
+                <a:ea typeface="Times Roman"/>
+                <a:cs typeface="Times Roman"/>
+                <a:sym typeface="Times Roman"/>
+              </a:rPr>
+              <a:t> </a:t>
             </a:r>
             <a:endParaRPr lang="pt-BR" sz="1200" dirty="0">
-              <a:latin typeface="Times New Roman"/>
-              <a:ea typeface="Times New Roman"/>
-              <a:cs typeface="Times New Roman"/>
-              <a:sym typeface="Times New Roman"/>
+              <a:latin typeface="Times Roman"/>
+              <a:ea typeface="Times Roman"/>
+              <a:cs typeface="Times Roman"/>
+              <a:sym typeface="Times Roman"/>
             </a:endParaRPr>
           </a:p>
         </p:txBody>
@@ -6323,7 +6220,7 @@
     </p:spTree>
     <p:extLst>
       <p:ext uri="{BB962C8B-B14F-4D97-AF65-F5344CB8AC3E}">
-        <p14:creationId xmlns:p14="http://schemas.microsoft.com/office/powerpoint/2010/main" val="939564200"/>
+        <p14:creationId xmlns:p14="http://schemas.microsoft.com/office/powerpoint/2010/main" val="1336780418"/>
       </p:ext>
     </p:extLst>
   </p:cSld>
@@ -6512,47 +6409,10 @@
       </p:pic>
       <p:sp>
         <p:nvSpPr>
-          <p:cNvPr id="3" name="Google Shape;207;g16475793bdd_0_87">
-            <a:extLst>
-              <a:ext uri="{FF2B5EF4-FFF2-40B4-BE49-F238E27FC236}">
-                <a16:creationId xmlns:a16="http://schemas.microsoft.com/office/drawing/2014/main" id="{44D578C5-6F64-624F-66F3-00C638634CC4}"/>
-              </a:ext>
-            </a:extLst>
-          </p:cNvPr>
-          <p:cNvSpPr txBox="1">
-            <a:spLocks noGrp="1"/>
-          </p:cNvSpPr>
-          <p:nvPr>
-            <p:ph type="title"/>
-          </p:nvPr>
-        </p:nvSpPr>
-        <p:spPr>
-          <a:xfrm>
-            <a:off x="2976476" y="523750"/>
-            <a:ext cx="8780700" cy="1325700"/>
-          </a:xfrm>
-          <a:prstGeom prst="rect">
-            <a:avLst/>
-          </a:prstGeom>
-        </p:spPr>
-        <p:txBody>
-          <a:bodyPr/>
-          <a:lstStyle/>
-          <a:p>
-            <a:r>
-              <a:rPr dirty="0" err="1"/>
-              <a:t>Referências</a:t>
-            </a:r>
-            <a:endParaRPr dirty="0"/>
-          </a:p>
-        </p:txBody>
-      </p:sp>
-      <p:sp>
-        <p:nvSpPr>
-          <p:cNvPr id="5" name="Google Shape;208;g16475793bdd_0_87">
-            <a:extLst>
-              <a:ext uri="{FF2B5EF4-FFF2-40B4-BE49-F238E27FC236}">
-                <a16:creationId xmlns:a16="http://schemas.microsoft.com/office/drawing/2014/main" id="{4670ED3D-0BA7-2B62-1E57-FEA432CFE786}"/>
+          <p:cNvPr id="10" name="Google Shape;201;g16475793bdd_0_111">
+            <a:extLst>
+              <a:ext uri="{FF2B5EF4-FFF2-40B4-BE49-F238E27FC236}">
+                <a16:creationId xmlns:a16="http://schemas.microsoft.com/office/drawing/2014/main" id="{69053C15-31BA-02F8-CF57-D8D9AC5CE48E}"/>
               </a:ext>
             </a:extLst>
           </p:cNvPr>
@@ -6563,8 +6423,63 @@
         </p:nvSpPr>
         <p:spPr>
           <a:xfrm>
-            <a:off x="2976474" y="1473799"/>
-            <a:ext cx="8377202" cy="5191202"/>
+            <a:off x="2976476" y="523750"/>
+            <a:ext cx="8780700" cy="1325700"/>
+          </a:xfrm>
+          <a:prstGeom prst="rect">
+            <a:avLst/>
+          </a:prstGeom>
+        </p:spPr>
+        <p:txBody>
+          <a:bodyPr vert="horz" lIns="91440" tIns="45720" rIns="91440" bIns="45720" rtlCol="0" anchor="ctr">
+            <a:normAutofit/>
+          </a:bodyPr>
+          <a:lstStyle>
+            <a:lvl1pPr algn="l" defTabSz="914400" rtl="0" eaLnBrk="1" latinLnBrk="0" hangingPunct="1">
+              <a:lnSpc>
+                <a:spcPct val="90000"/>
+              </a:lnSpc>
+              <a:spcBef>
+                <a:spcPct val="0"/>
+              </a:spcBef>
+              <a:buNone/>
+              <a:defRPr sz="4400" kern="1200">
+                <a:solidFill>
+                  <a:schemeClr val="tx1"/>
+                </a:solidFill>
+                <a:latin typeface="+mj-lt"/>
+                <a:ea typeface="+mj-ea"/>
+                <a:cs typeface="+mj-cs"/>
+              </a:defRPr>
+            </a:lvl1pPr>
+          </a:lstStyle>
+          <a:p>
+            <a:r>
+              <a:rPr lang="pt-BR"/>
+              <a:t>Agradecimento</a:t>
+            </a:r>
+            <a:endParaRPr lang="pt-BR" dirty="0"/>
+          </a:p>
+        </p:txBody>
+      </p:sp>
+      <p:sp>
+        <p:nvSpPr>
+          <p:cNvPr id="11" name="Google Shape;202;g16475793bdd_0_111">
+            <a:extLst>
+              <a:ext uri="{FF2B5EF4-FFF2-40B4-BE49-F238E27FC236}">
+                <a16:creationId xmlns:a16="http://schemas.microsoft.com/office/drawing/2014/main" id="{68DCAF01-ACF5-F545-D82C-EA607C826329}"/>
+              </a:ext>
+            </a:extLst>
+          </p:cNvPr>
+          <p:cNvSpPr txBox="1">
+            <a:spLocks/>
+          </p:cNvSpPr>
+          <p:nvPr/>
+        </p:nvSpPr>
+        <p:spPr>
+          <a:xfrm>
+            <a:off x="2976474" y="2136650"/>
+            <a:ext cx="8370901" cy="4857601"/>
           </a:xfrm>
           <a:prstGeom prst="rect">
             <a:avLst/>
@@ -6575,16 +6490,17 @@
             <a:normAutofit/>
           </a:bodyPr>
           <a:lstStyle>
-            <a:lvl1pPr marL="228600" indent="-228600" algn="l" defTabSz="914400" rtl="0" eaLnBrk="1" latinLnBrk="0" hangingPunct="1">
-              <a:lnSpc>
-                <a:spcPct val="90000"/>
-              </a:lnSpc>
-              <a:spcBef>
-                <a:spcPts val="1000"/>
-              </a:spcBef>
+            <a:lvl1pPr marL="0" indent="457200" algn="l" defTabSz="914400" rtl="0" eaLnBrk="1" latinLnBrk="0" hangingPunct="1">
+              <a:lnSpc>
+                <a:spcPct val="200000"/>
+              </a:lnSpc>
+              <a:spcBef>
+                <a:spcPts val="0"/>
+              </a:spcBef>
+              <a:buSzTx/>
               <a:buFont typeface="Arial" panose="020B0604020202020204" pitchFamily="34" charset="0"/>
-              <a:buChar char="•"/>
-              <a:defRPr sz="2800" kern="1200">
+              <a:buNone/>
+              <a:defRPr sz="1800" kern="1200">
                 <a:solidFill>
                   <a:schemeClr val="tx1"/>
                 </a:solidFill>
@@ -6739,248 +6655,23 @@
             </a:lvl9pPr>
           </a:lstStyle>
           <a:p>
-            <a:pPr indent="-292100">
-              <a:lnSpc>
-                <a:spcPct val="160000"/>
-              </a:lnSpc>
-              <a:spcBef>
-                <a:spcPts val="0"/>
-              </a:spcBef>
-              <a:buSzPct val="100000"/>
-              <a:defRPr sz="1000"/>
-            </a:pPr>
-            <a:r>
-              <a:rPr lang="pt-BR" sz="1000"/>
-              <a:t>Al Nuaimi, Eiman; Al Neyadi, Hind; Mohamed, Nader; Al-Jaroodi, Jameela. Applications of big data to smart cities. Journal of Internet Services and Applications, v. 6, n. 1, p. 1-15, 2015.</a:t>
-            </a:r>
-            <a:endParaRPr lang="pt-BR" sz="1200">
+            <a:r>
+              <a:rPr lang="pt-BR"/>
+              <a:t>Os autores agradecem ao CNPq e à Pontifícia Universidade Católica de Campinas pela oportunidade e incentivo de desenvolver pesquisa no país e pela bolsa PIBIC recebida.</a:t>
+            </a:r>
+            <a:endParaRPr lang="pt-BR" sz="1200" dirty="0">
               <a:latin typeface="Times New Roman"/>
               <a:ea typeface="Times New Roman"/>
               <a:cs typeface="Times New Roman"/>
               <a:sym typeface="Times New Roman"/>
             </a:endParaRPr>
           </a:p>
-          <a:p>
-            <a:pPr indent="-292100">
-              <a:lnSpc>
-                <a:spcPct val="160000"/>
-              </a:lnSpc>
-              <a:spcBef>
-                <a:spcPts val="0"/>
-              </a:spcBef>
-              <a:buSzPct val="100000"/>
-              <a:defRPr sz="1000"/>
-            </a:pPr>
-            <a:r>
-              <a:rPr lang="pt-BR" sz="1000"/>
-              <a:t>Bassi, Alessandro; HORN, Geir. Internet of Things in 2020: A Roadmap for the Future. European Commission: Information Society and Media, v. 22, p. 97-114, 2008.</a:t>
-            </a:r>
-            <a:endParaRPr lang="pt-BR" sz="1200">
-              <a:latin typeface="Times New Roman"/>
-              <a:ea typeface="Times New Roman"/>
-              <a:cs typeface="Times New Roman"/>
-              <a:sym typeface="Times New Roman"/>
-            </a:endParaRPr>
-          </a:p>
-          <a:p>
-            <a:pPr indent="-292100">
-              <a:lnSpc>
-                <a:spcPct val="160000"/>
-              </a:lnSpc>
-              <a:spcBef>
-                <a:spcPts val="0"/>
-              </a:spcBef>
-              <a:buSzPct val="100000"/>
-              <a:defRPr sz="1000"/>
-            </a:pPr>
-            <a:r>
-              <a:rPr lang="pt-BR" sz="1000"/>
-              <a:t>Brasil. Política Nacional de Recursos Hídricos, 1997.</a:t>
-            </a:r>
-            <a:endParaRPr lang="pt-BR" sz="1200">
-              <a:latin typeface="Times New Roman"/>
-              <a:ea typeface="Times New Roman"/>
-              <a:cs typeface="Times New Roman"/>
-              <a:sym typeface="Times New Roman"/>
-            </a:endParaRPr>
-          </a:p>
-          <a:p>
-            <a:pPr indent="-292100">
-              <a:lnSpc>
-                <a:spcPct val="160000"/>
-              </a:lnSpc>
-              <a:spcBef>
-                <a:spcPts val="0"/>
-              </a:spcBef>
-              <a:buSzPct val="100000"/>
-              <a:defRPr sz="1000"/>
-            </a:pPr>
-            <a:r>
-              <a:rPr lang="pt-BR" sz="1000"/>
-              <a:t>Caragliu, A.; Del Bo, C.; Nijkamp, P. . Smart Cities in Europe. Journal of Urban Technology, 2011. Vol. 2, n. 18, p. 65-82.</a:t>
-            </a:r>
-            <a:endParaRPr lang="pt-BR" sz="1200">
-              <a:latin typeface="Times New Roman"/>
-              <a:ea typeface="Times New Roman"/>
-              <a:cs typeface="Times New Roman"/>
-              <a:sym typeface="Times New Roman"/>
-            </a:endParaRPr>
-          </a:p>
-          <a:p>
-            <a:pPr indent="-292100">
-              <a:lnSpc>
-                <a:spcPct val="160000"/>
-              </a:lnSpc>
-              <a:spcBef>
-                <a:spcPts val="0"/>
-              </a:spcBef>
-              <a:buSzPct val="100000"/>
-              <a:defRPr sz="1000"/>
-            </a:pPr>
-            <a:r>
-              <a:rPr lang="pt-BR" sz="1000"/>
-              <a:t>Carrion, Patrícia; Quaresma, Manuela. Internet da Coisas (IoT): Definições e aplicabilidade aos usuários finais. Human Factors in Design, v. 8, n. 15, p. 049-066, 2019.</a:t>
-            </a:r>
-            <a:endParaRPr lang="pt-BR" sz="1200">
-              <a:latin typeface="Times New Roman"/>
-              <a:ea typeface="Times New Roman"/>
-              <a:cs typeface="Times New Roman"/>
-              <a:sym typeface="Times New Roman"/>
-            </a:endParaRPr>
-          </a:p>
-          <a:p>
-            <a:pPr indent="-292100">
-              <a:lnSpc>
-                <a:spcPct val="160000"/>
-              </a:lnSpc>
-              <a:spcBef>
-                <a:spcPts val="0"/>
-              </a:spcBef>
-              <a:buSzPct val="100000"/>
-              <a:defRPr sz="1000"/>
-            </a:pPr>
-            <a:r>
-              <a:rPr lang="pt-BR" sz="1000"/>
-              <a:t>Coutinho, Pedro Caldas. Big Data em cidades inteligentes: um mapeamento sistemático. 2019. </a:t>
-            </a:r>
-            <a:endParaRPr lang="pt-BR" sz="1200">
-              <a:latin typeface="Times New Roman"/>
-              <a:ea typeface="Times New Roman"/>
-              <a:cs typeface="Times New Roman"/>
-              <a:sym typeface="Times New Roman"/>
-            </a:endParaRPr>
-          </a:p>
-          <a:p>
-            <a:pPr indent="-292100">
-              <a:lnSpc>
-                <a:spcPct val="160000"/>
-              </a:lnSpc>
-              <a:spcBef>
-                <a:spcPts val="0"/>
-              </a:spcBef>
-              <a:buSzPct val="100000"/>
-              <a:defRPr sz="1000"/>
-            </a:pPr>
-            <a:r>
-              <a:rPr lang="pt-BR" sz="1000"/>
-              <a:t>Cruz, Matheus; BARCELLOS, Raissa; BERNARDINI, Flavia. Inteligência Artificial no Governo Eletrônico em Cidades Inteligentes: Possibilidades e Desafios. Computação Brasil, n. 43, p. 27-30, 2020. </a:t>
-            </a:r>
-            <a:endParaRPr lang="pt-BR" sz="1200">
-              <a:latin typeface="Times New Roman"/>
-              <a:ea typeface="Times New Roman"/>
-              <a:cs typeface="Times New Roman"/>
-              <a:sym typeface="Times New Roman"/>
-            </a:endParaRPr>
-          </a:p>
-          <a:p>
-            <a:pPr indent="-292100">
-              <a:lnSpc>
-                <a:spcPct val="160000"/>
-              </a:lnSpc>
-              <a:spcBef>
-                <a:spcPts val="0"/>
-              </a:spcBef>
-              <a:buSzPct val="100000"/>
-              <a:defRPr sz="1000"/>
-            </a:pPr>
-            <a:r>
-              <a:rPr lang="pt-BR" sz="1000"/>
-              <a:t>Cunha, Izabella Bauer de Assis; Baracho, Renata Maria Abrantes. Dados Abertos e suas aplicações em Cidades Inteligentes. Liinc em Revista, v. 15, n. 2, 2019.</a:t>
-            </a:r>
-            <a:endParaRPr lang="pt-BR" sz="1200">
-              <a:latin typeface="Times New Roman"/>
-              <a:ea typeface="Times New Roman"/>
-              <a:cs typeface="Times New Roman"/>
-              <a:sym typeface="Times New Roman"/>
-            </a:endParaRPr>
-          </a:p>
-          <a:p>
-            <a:pPr indent="-292100">
-              <a:lnSpc>
-                <a:spcPct val="160000"/>
-              </a:lnSpc>
-              <a:spcBef>
-                <a:spcPts val="0"/>
-              </a:spcBef>
-              <a:buSzPct val="100000"/>
-              <a:defRPr sz="1000"/>
-            </a:pPr>
-            <a:r>
-              <a:rPr lang="pt-BR" sz="1000"/>
-              <a:t>Debattista, Jeremy; Lange, Christoph; Scerri, Simon; Auer, Sören. Linked'Big'Data: towards a manifold increase in big data value and veracity. In: 2015 IEEE/ACM 2nd International Symposium on Big Data Computing (BDC). IEEE, 2015. p. 92-98.</a:t>
-            </a:r>
-            <a:endParaRPr lang="pt-BR" sz="1200">
-              <a:latin typeface="Times New Roman"/>
-              <a:ea typeface="Times New Roman"/>
-              <a:cs typeface="Times New Roman"/>
-              <a:sym typeface="Times New Roman"/>
-            </a:endParaRPr>
-          </a:p>
-          <a:p>
-            <a:pPr indent="-292100">
-              <a:lnSpc>
-                <a:spcPct val="160000"/>
-              </a:lnSpc>
-              <a:spcBef>
-                <a:spcPts val="0"/>
-              </a:spcBef>
-              <a:buSzPct val="100000"/>
-              <a:defRPr sz="1000"/>
-            </a:pPr>
-            <a:r>
-              <a:rPr lang="pt-BR" sz="1000"/>
-              <a:t>Farias, José Ewerton P. de; Alencar, Marcelo S.; Lima, Ísis A.; Alencar, Raphael T. Cidades Inteligentes e Comunicações. Revista de tecnologia da informação e comunicação, n.1, 2011.</a:t>
-            </a:r>
-            <a:endParaRPr lang="pt-BR" sz="1200">
-              <a:latin typeface="Times New Roman"/>
-              <a:ea typeface="Times New Roman"/>
-              <a:cs typeface="Times New Roman"/>
-              <a:sym typeface="Times New Roman"/>
-            </a:endParaRPr>
-          </a:p>
-          <a:p>
-            <a:pPr indent="-292100">
-              <a:lnSpc>
-                <a:spcPct val="160000"/>
-              </a:lnSpc>
-              <a:spcBef>
-                <a:spcPts val="0"/>
-              </a:spcBef>
-              <a:buSzPct val="100000"/>
-              <a:defRPr sz="1000"/>
-            </a:pPr>
-            <a:r>
-              <a:rPr lang="pt-BR" sz="1000"/>
-              <a:t>Gil, Antonio Carlos. Como elaborar projetos de pesquisa. São Paulo, v. 5, n. 61, p. 16-17, 2002.</a:t>
-            </a:r>
-            <a:endParaRPr lang="pt-BR" sz="1000" dirty="0"/>
-          </a:p>
         </p:txBody>
       </p:sp>
     </p:spTree>
     <p:extLst>
       <p:ext uri="{BB962C8B-B14F-4D97-AF65-F5344CB8AC3E}">
-        <p14:creationId xmlns:p14="http://schemas.microsoft.com/office/powerpoint/2010/main" val="2324957561"/>
+        <p14:creationId xmlns:p14="http://schemas.microsoft.com/office/powerpoint/2010/main" val="939564200"/>
       </p:ext>
     </p:extLst>
   </p:cSld>
@@ -7206,10 +6897,10 @@
       </p:sp>
       <p:sp>
         <p:nvSpPr>
-          <p:cNvPr id="4" name="Google Shape;214;g16475793bdd_0_139">
-            <a:extLst>
-              <a:ext uri="{FF2B5EF4-FFF2-40B4-BE49-F238E27FC236}">
-                <a16:creationId xmlns:a16="http://schemas.microsoft.com/office/drawing/2014/main" id="{C8B9A358-0C4A-FC0C-0111-9DF0CAD02FBD}"/>
+          <p:cNvPr id="5" name="Google Shape;208;g16475793bdd_0_87">
+            <a:extLst>
+              <a:ext uri="{FF2B5EF4-FFF2-40B4-BE49-F238E27FC236}">
+                <a16:creationId xmlns:a16="http://schemas.microsoft.com/office/drawing/2014/main" id="{4670ED3D-0BA7-2B62-1E57-FEA432CFE786}"/>
               </a:ext>
             </a:extLst>
           </p:cNvPr>
@@ -7220,8 +6911,8 @@
         </p:nvSpPr>
         <p:spPr>
           <a:xfrm>
-            <a:off x="2964626" y="1580662"/>
-            <a:ext cx="8377201" cy="5276401"/>
+            <a:off x="2976474" y="1473799"/>
+            <a:ext cx="8377202" cy="5191202"/>
           </a:xfrm>
           <a:prstGeom prst="rect">
             <a:avLst/>
@@ -7398,17 +7089,17 @@
           <a:p>
             <a:pPr indent="-292100">
               <a:lnSpc>
-                <a:spcPct val="200000"/>
+                <a:spcPct val="160000"/>
               </a:lnSpc>
               <a:spcBef>
                 <a:spcPts val="0"/>
               </a:spcBef>
-              <a:buSzPts val="1000"/>
+              <a:buSzPct val="100000"/>
               <a:defRPr sz="1000"/>
             </a:pPr>
             <a:r>
               <a:rPr lang="pt-BR" sz="1000"/>
-              <a:t>Gleick, P.; Iceland, C. Water, Security, and Conflict. Issue Brief. World Resource Institute and Pacific Institute, p. 1–16, ago. 2018.</a:t>
+              <a:t>Al Nuaimi, Eiman; Al Neyadi, Hind; Mohamed, Nader; Al-Jaroodi, Jameela. Applications of big data to smart cities. Journal of Internet Services and Applications, v. 6, n. 1, p. 1-15, 2015.</a:t>
             </a:r>
             <a:endParaRPr lang="pt-BR" sz="1200">
               <a:latin typeface="Times New Roman"/>
@@ -7420,17 +7111,17 @@
           <a:p>
             <a:pPr indent="-292100">
               <a:lnSpc>
-                <a:spcPct val="200000"/>
+                <a:spcPct val="160000"/>
               </a:lnSpc>
               <a:spcBef>
                 <a:spcPts val="0"/>
               </a:spcBef>
-              <a:buSzPts val="1000"/>
+              <a:buSzPct val="100000"/>
               <a:defRPr sz="1000"/>
             </a:pPr>
             <a:r>
               <a:rPr lang="pt-BR" sz="1000"/>
-              <a:t>Gomes, D. dos S. Inteligência Artificial: conceitos e aplicações. Olhar Científico. v1, n. 2, p. 234-246, 2010.</a:t>
+              <a:t>Bassi, Alessandro; HORN, Geir. Internet of Things in 2020: A Roadmap for the Future. European Commission: Information Society and Media, v. 22, p. 97-114, 2008.</a:t>
             </a:r>
             <a:endParaRPr lang="pt-BR" sz="1200">
               <a:latin typeface="Times New Roman"/>
@@ -7442,17 +7133,17 @@
           <a:p>
             <a:pPr indent="-292100">
               <a:lnSpc>
-                <a:spcPct val="200000"/>
+                <a:spcPct val="160000"/>
               </a:lnSpc>
               <a:spcBef>
                 <a:spcPts val="0"/>
               </a:spcBef>
-              <a:buSzPts val="1000"/>
+              <a:buSzPct val="100000"/>
               <a:defRPr sz="1000"/>
             </a:pPr>
             <a:r>
               <a:rPr lang="pt-BR" sz="1000"/>
-              <a:t>João, Belmiro do Nascimento; Souza, Crisomar Lobo de; Serralvo, Francisco Antonio. Revisão sistemática de cidades inteligentes e internet das coisas como tópico de pesquisa. Cadernos Ebape. br, v. 17, p. 1115-1130, 2020.</a:t>
+              <a:t>Brasil. Política Nacional de Recursos Hídricos, 1997.</a:t>
             </a:r>
             <a:endParaRPr lang="pt-BR" sz="1200">
               <a:latin typeface="Times New Roman"/>
@@ -7464,17 +7155,17 @@
           <a:p>
             <a:pPr indent="-292100">
               <a:lnSpc>
-                <a:spcPct val="200000"/>
+                <a:spcPct val="160000"/>
               </a:lnSpc>
               <a:spcBef>
                 <a:spcPts val="0"/>
               </a:spcBef>
-              <a:buSzPts val="1000"/>
+              <a:buSzPct val="100000"/>
               <a:defRPr sz="1000"/>
             </a:pPr>
             <a:r>
               <a:rPr lang="pt-BR" sz="1000"/>
-              <a:t>Johnsson, Rosa Maria Formiga; Melo, Marilia Carvalho de. O conceito emergente de segurança hídrica. Sustentare, v. 1, n. 1, p. 72-92, 2018.</a:t>
+              <a:t>Caragliu, A.; Del Bo, C.; Nijkamp, P. . Smart Cities in Europe. Journal of Urban Technology, 2011. Vol. 2, n. 18, p. 65-82.</a:t>
             </a:r>
             <a:endParaRPr lang="pt-BR" sz="1200">
               <a:latin typeface="Times New Roman"/>
@@ -7486,17 +7177,17 @@
           <a:p>
             <a:pPr indent="-292100">
               <a:lnSpc>
-                <a:spcPct val="200000"/>
+                <a:spcPct val="160000"/>
               </a:lnSpc>
               <a:spcBef>
                 <a:spcPts val="0"/>
               </a:spcBef>
-              <a:buSzPts val="1000"/>
+              <a:buSzPct val="100000"/>
               <a:defRPr sz="1000"/>
             </a:pPr>
             <a:r>
               <a:rPr lang="pt-BR" sz="1000"/>
-              <a:t>Kaufman, Dora. A inteligência artificial irá suplantar a inteligência humana? ESTAÇÃO DAS LETRAS E CORES EDI, 2019.</a:t>
+              <a:t>Carrion, Patrícia; Quaresma, Manuela. Internet da Coisas (IoT): Definições e aplicabilidade aos usuários finais. Human Factors in Design, v. 8, n. 15, p. 049-066, 2019.</a:t>
             </a:r>
             <a:endParaRPr lang="pt-BR" sz="1200">
               <a:latin typeface="Times New Roman"/>
@@ -7508,17 +7199,17 @@
           <a:p>
             <a:pPr indent="-292100">
               <a:lnSpc>
-                <a:spcPct val="200000"/>
+                <a:spcPct val="160000"/>
               </a:lnSpc>
               <a:spcBef>
                 <a:spcPts val="0"/>
               </a:spcBef>
-              <a:buSzPts val="1000"/>
+              <a:buSzPct val="100000"/>
               <a:defRPr sz="1000"/>
             </a:pPr>
             <a:r>
               <a:rPr lang="pt-BR" sz="1000"/>
-              <a:t>Kon, Fabio; Santana, Eduardo Felipe Zambom. Cidades Inteligentes: Conceitos, plataformas e desafios. Jornadas de atualização em informática, v. 17, 2016.</a:t>
+              <a:t>Coutinho, Pedro Caldas. Big Data em cidades inteligentes: um mapeamento sistemático. 2019. </a:t>
             </a:r>
             <a:endParaRPr lang="pt-BR" sz="1200">
               <a:latin typeface="Times New Roman"/>
@@ -7530,17 +7221,17 @@
           <a:p>
             <a:pPr indent="-292100">
               <a:lnSpc>
-                <a:spcPct val="200000"/>
+                <a:spcPct val="160000"/>
               </a:lnSpc>
               <a:spcBef>
                 <a:spcPts val="0"/>
               </a:spcBef>
-              <a:buSzPts val="1000"/>
+              <a:buSzPct val="100000"/>
               <a:defRPr sz="1000"/>
             </a:pPr>
             <a:r>
               <a:rPr lang="pt-BR" sz="1000"/>
-              <a:t>Krishnamachari, Bhaskar; Power, Jerry; Kim, Seon Ho; Shahabi, Cyrus. I3: An IoT marketplace for smart communities. In: Proceedings of the 16th Annual International Conference on Mobile Systems, Applications, and Services. 2018. p. 498-499. </a:t>
+              <a:t>Cruz, Matheus; BARCELLOS, Raissa; BERNARDINI, Flavia. Inteligência Artificial no Governo Eletrônico em Cidades Inteligentes: Possibilidades e Desafios. Computação Brasil, n. 43, p. 27-30, 2020. </a:t>
             </a:r>
             <a:endParaRPr lang="pt-BR" sz="1200">
               <a:latin typeface="Times New Roman"/>
@@ -7552,17 +7243,17 @@
           <a:p>
             <a:pPr indent="-292100">
               <a:lnSpc>
-                <a:spcPct val="200000"/>
+                <a:spcPct val="160000"/>
               </a:lnSpc>
               <a:spcBef>
                 <a:spcPts val="0"/>
               </a:spcBef>
-              <a:buSzPts val="1000"/>
+              <a:buSzPct val="100000"/>
               <a:defRPr sz="1000"/>
             </a:pPr>
             <a:r>
               <a:rPr lang="pt-BR" sz="1000"/>
-              <a:t>Lemos, André; De que forma as novas tecnologias - como a computação em nuvem, o Big Data e a internet Das coisas - podem melhorar a condição de vida nos espaços urbanos?. Revista GV-EXECUTIVO - Fundação Getúlio Vargas, v. 12 n. 2, 2013.</a:t>
+              <a:t>Cunha, Izabella Bauer de Assis; Baracho, Renata Maria Abrantes. Dados Abertos e suas aplicações em Cidades Inteligentes. Liinc em Revista, v. 15, n. 2, 2019.</a:t>
             </a:r>
             <a:endParaRPr lang="pt-BR" sz="1200">
               <a:latin typeface="Times New Roman"/>
@@ -7572,28 +7263,63 @@
             </a:endParaRPr>
           </a:p>
           <a:p>
-            <a:pPr marL="437716" indent="-272616">
-              <a:lnSpc>
-                <a:spcPct val="200000"/>
+            <a:pPr indent="-292100">
+              <a:lnSpc>
+                <a:spcPct val="160000"/>
               </a:lnSpc>
               <a:spcBef>
                 <a:spcPts val="0"/>
               </a:spcBef>
-              <a:buSzPts val="900"/>
+              <a:buSzPct val="100000"/>
               <a:defRPr sz="1000"/>
             </a:pPr>
             <a:r>
-              <a:rPr lang="pt-BR" sz="933">
-                <a:latin typeface="Times New Roman"/>
-                <a:ea typeface="Times New Roman"/>
-                <a:cs typeface="Times New Roman"/>
-                <a:sym typeface="Times New Roman"/>
-              </a:rPr>
-              <a:t> </a:t>
-            </a:r>
-            <a:r>
               <a:rPr lang="pt-BR" sz="1000"/>
-              <a:t>Nam, T.; Pardo, T.A. Conceptualizing smart city with dimensions of technology, people and institutions. In: ANNUAL INTERNATIONAL CONFERENCE ON DIGITAL, 2011.</a:t>
+              <a:t>Debattista, Jeremy; Lange, Christoph; Scerri, Simon; Auer, Sören. Linked'Big'Data: towards a manifold increase in big data value and veracity. In: 2015 IEEE/ACM 2nd International Symposium on Big Data Computing (BDC). IEEE, 2015. p. 92-98.</a:t>
+            </a:r>
+            <a:endParaRPr lang="pt-BR" sz="1200">
+              <a:latin typeface="Times New Roman"/>
+              <a:ea typeface="Times New Roman"/>
+              <a:cs typeface="Times New Roman"/>
+              <a:sym typeface="Times New Roman"/>
+            </a:endParaRPr>
+          </a:p>
+          <a:p>
+            <a:pPr indent="-292100">
+              <a:lnSpc>
+                <a:spcPct val="160000"/>
+              </a:lnSpc>
+              <a:spcBef>
+                <a:spcPts val="0"/>
+              </a:spcBef>
+              <a:buSzPct val="100000"/>
+              <a:defRPr sz="1000"/>
+            </a:pPr>
+            <a:r>
+              <a:rPr lang="pt-BR" sz="1000"/>
+              <a:t>Farias, José Ewerton P. de; Alencar, Marcelo S.; Lima, Ísis A.; Alencar, Raphael T. Cidades Inteligentes e Comunicações. Revista de tecnologia da informação e comunicação, n.1, 2011.</a:t>
+            </a:r>
+            <a:endParaRPr lang="pt-BR" sz="1200">
+              <a:latin typeface="Times New Roman"/>
+              <a:ea typeface="Times New Roman"/>
+              <a:cs typeface="Times New Roman"/>
+              <a:sym typeface="Times New Roman"/>
+            </a:endParaRPr>
+          </a:p>
+          <a:p>
+            <a:pPr indent="-292100">
+              <a:lnSpc>
+                <a:spcPct val="160000"/>
+              </a:lnSpc>
+              <a:spcBef>
+                <a:spcPts val="0"/>
+              </a:spcBef>
+              <a:buSzPct val="100000"/>
+              <a:defRPr sz="1000"/>
+            </a:pPr>
+            <a:r>
+              <a:rPr lang="pt-BR" sz="1000"/>
+              <a:t>Gil, Antonio Carlos. Como elaborar projetos de pesquisa. São Paulo, v. 5, n. 61, p. 16-17, 2002.</a:t>
             </a:r>
             <a:endParaRPr lang="pt-BR" sz="1000" dirty="0"/>
           </a:p>
@@ -7602,7 +7328,7 @@
     </p:spTree>
     <p:extLst>
       <p:ext uri="{BB962C8B-B14F-4D97-AF65-F5344CB8AC3E}">
-        <p14:creationId xmlns:p14="http://schemas.microsoft.com/office/powerpoint/2010/main" val="2417284442"/>
+        <p14:creationId xmlns:p14="http://schemas.microsoft.com/office/powerpoint/2010/main" val="2324957561"/>
       </p:ext>
     </p:extLst>
   </p:cSld>
@@ -7828,6 +7554,628 @@
       </p:sp>
       <p:sp>
         <p:nvSpPr>
+          <p:cNvPr id="4" name="Google Shape;214;g16475793bdd_0_139">
+            <a:extLst>
+              <a:ext uri="{FF2B5EF4-FFF2-40B4-BE49-F238E27FC236}">
+                <a16:creationId xmlns:a16="http://schemas.microsoft.com/office/drawing/2014/main" id="{C8B9A358-0C4A-FC0C-0111-9DF0CAD02FBD}"/>
+              </a:ext>
+            </a:extLst>
+          </p:cNvPr>
+          <p:cNvSpPr txBox="1">
+            <a:spLocks/>
+          </p:cNvSpPr>
+          <p:nvPr/>
+        </p:nvSpPr>
+        <p:spPr>
+          <a:xfrm>
+            <a:off x="2964626" y="1580662"/>
+            <a:ext cx="8377201" cy="5276401"/>
+          </a:xfrm>
+          <a:prstGeom prst="rect">
+            <a:avLst/>
+          </a:prstGeom>
+        </p:spPr>
+        <p:txBody>
+          <a:bodyPr vert="horz" lIns="91440" tIns="45720" rIns="91440" bIns="45720" rtlCol="0">
+            <a:normAutofit/>
+          </a:bodyPr>
+          <a:lstStyle>
+            <a:lvl1pPr marL="228600" indent="-228600" algn="l" defTabSz="914400" rtl="0" eaLnBrk="1" latinLnBrk="0" hangingPunct="1">
+              <a:lnSpc>
+                <a:spcPct val="90000"/>
+              </a:lnSpc>
+              <a:spcBef>
+                <a:spcPts val="1000"/>
+              </a:spcBef>
+              <a:buFont typeface="Arial" panose="020B0604020202020204" pitchFamily="34" charset="0"/>
+              <a:buChar char="•"/>
+              <a:defRPr sz="2800" kern="1200">
+                <a:solidFill>
+                  <a:schemeClr val="tx1"/>
+                </a:solidFill>
+                <a:latin typeface="+mn-lt"/>
+                <a:ea typeface="+mn-ea"/>
+                <a:cs typeface="+mn-cs"/>
+              </a:defRPr>
+            </a:lvl1pPr>
+            <a:lvl2pPr marL="685800" indent="-228600" algn="l" defTabSz="914400" rtl="0" eaLnBrk="1" latinLnBrk="0" hangingPunct="1">
+              <a:lnSpc>
+                <a:spcPct val="90000"/>
+              </a:lnSpc>
+              <a:spcBef>
+                <a:spcPts val="500"/>
+              </a:spcBef>
+              <a:buFont typeface="Arial" panose="020B0604020202020204" pitchFamily="34" charset="0"/>
+              <a:buChar char="•"/>
+              <a:defRPr sz="2400" kern="1200">
+                <a:solidFill>
+                  <a:schemeClr val="tx1"/>
+                </a:solidFill>
+                <a:latin typeface="+mn-lt"/>
+                <a:ea typeface="+mn-ea"/>
+                <a:cs typeface="+mn-cs"/>
+              </a:defRPr>
+            </a:lvl2pPr>
+            <a:lvl3pPr marL="1143000" indent="-228600" algn="l" defTabSz="914400" rtl="0" eaLnBrk="1" latinLnBrk="0" hangingPunct="1">
+              <a:lnSpc>
+                <a:spcPct val="90000"/>
+              </a:lnSpc>
+              <a:spcBef>
+                <a:spcPts val="500"/>
+              </a:spcBef>
+              <a:buFont typeface="Arial" panose="020B0604020202020204" pitchFamily="34" charset="0"/>
+              <a:buChar char="•"/>
+              <a:defRPr sz="2000" kern="1200">
+                <a:solidFill>
+                  <a:schemeClr val="tx1"/>
+                </a:solidFill>
+                <a:latin typeface="+mn-lt"/>
+                <a:ea typeface="+mn-ea"/>
+                <a:cs typeface="+mn-cs"/>
+              </a:defRPr>
+            </a:lvl3pPr>
+            <a:lvl4pPr marL="1600200" indent="-228600" algn="l" defTabSz="914400" rtl="0" eaLnBrk="1" latinLnBrk="0" hangingPunct="1">
+              <a:lnSpc>
+                <a:spcPct val="90000"/>
+              </a:lnSpc>
+              <a:spcBef>
+                <a:spcPts val="500"/>
+              </a:spcBef>
+              <a:buFont typeface="Arial" panose="020B0604020202020204" pitchFamily="34" charset="0"/>
+              <a:buChar char="•"/>
+              <a:defRPr sz="1800" kern="1200">
+                <a:solidFill>
+                  <a:schemeClr val="tx1"/>
+                </a:solidFill>
+                <a:latin typeface="+mn-lt"/>
+                <a:ea typeface="+mn-ea"/>
+                <a:cs typeface="+mn-cs"/>
+              </a:defRPr>
+            </a:lvl4pPr>
+            <a:lvl5pPr marL="2057400" indent="-228600" algn="l" defTabSz="914400" rtl="0" eaLnBrk="1" latinLnBrk="0" hangingPunct="1">
+              <a:lnSpc>
+                <a:spcPct val="90000"/>
+              </a:lnSpc>
+              <a:spcBef>
+                <a:spcPts val="500"/>
+              </a:spcBef>
+              <a:buFont typeface="Arial" panose="020B0604020202020204" pitchFamily="34" charset="0"/>
+              <a:buChar char="•"/>
+              <a:defRPr sz="1800" kern="1200">
+                <a:solidFill>
+                  <a:schemeClr val="tx1"/>
+                </a:solidFill>
+                <a:latin typeface="+mn-lt"/>
+                <a:ea typeface="+mn-ea"/>
+                <a:cs typeface="+mn-cs"/>
+              </a:defRPr>
+            </a:lvl5pPr>
+            <a:lvl6pPr marL="2514600" indent="-228600" algn="l" defTabSz="914400" rtl="0" eaLnBrk="1" latinLnBrk="0" hangingPunct="1">
+              <a:lnSpc>
+                <a:spcPct val="90000"/>
+              </a:lnSpc>
+              <a:spcBef>
+                <a:spcPts val="500"/>
+              </a:spcBef>
+              <a:buFont typeface="Arial" panose="020B0604020202020204" pitchFamily="34" charset="0"/>
+              <a:buChar char="•"/>
+              <a:defRPr sz="1800" kern="1200">
+                <a:solidFill>
+                  <a:schemeClr val="tx1"/>
+                </a:solidFill>
+                <a:latin typeface="+mn-lt"/>
+                <a:ea typeface="+mn-ea"/>
+                <a:cs typeface="+mn-cs"/>
+              </a:defRPr>
+            </a:lvl6pPr>
+            <a:lvl7pPr marL="2971800" indent="-228600" algn="l" defTabSz="914400" rtl="0" eaLnBrk="1" latinLnBrk="0" hangingPunct="1">
+              <a:lnSpc>
+                <a:spcPct val="90000"/>
+              </a:lnSpc>
+              <a:spcBef>
+                <a:spcPts val="500"/>
+              </a:spcBef>
+              <a:buFont typeface="Arial" panose="020B0604020202020204" pitchFamily="34" charset="0"/>
+              <a:buChar char="•"/>
+              <a:defRPr sz="1800" kern="1200">
+                <a:solidFill>
+                  <a:schemeClr val="tx1"/>
+                </a:solidFill>
+                <a:latin typeface="+mn-lt"/>
+                <a:ea typeface="+mn-ea"/>
+                <a:cs typeface="+mn-cs"/>
+              </a:defRPr>
+            </a:lvl7pPr>
+            <a:lvl8pPr marL="3429000" indent="-228600" algn="l" defTabSz="914400" rtl="0" eaLnBrk="1" latinLnBrk="0" hangingPunct="1">
+              <a:lnSpc>
+                <a:spcPct val="90000"/>
+              </a:lnSpc>
+              <a:spcBef>
+                <a:spcPts val="500"/>
+              </a:spcBef>
+              <a:buFont typeface="Arial" panose="020B0604020202020204" pitchFamily="34" charset="0"/>
+              <a:buChar char="•"/>
+              <a:defRPr sz="1800" kern="1200">
+                <a:solidFill>
+                  <a:schemeClr val="tx1"/>
+                </a:solidFill>
+                <a:latin typeface="+mn-lt"/>
+                <a:ea typeface="+mn-ea"/>
+                <a:cs typeface="+mn-cs"/>
+              </a:defRPr>
+            </a:lvl8pPr>
+            <a:lvl9pPr marL="3886200" indent="-228600" algn="l" defTabSz="914400" rtl="0" eaLnBrk="1" latinLnBrk="0" hangingPunct="1">
+              <a:lnSpc>
+                <a:spcPct val="90000"/>
+              </a:lnSpc>
+              <a:spcBef>
+                <a:spcPts val="500"/>
+              </a:spcBef>
+              <a:buFont typeface="Arial" panose="020B0604020202020204" pitchFamily="34" charset="0"/>
+              <a:buChar char="•"/>
+              <a:defRPr sz="1800" kern="1200">
+                <a:solidFill>
+                  <a:schemeClr val="tx1"/>
+                </a:solidFill>
+                <a:latin typeface="+mn-lt"/>
+                <a:ea typeface="+mn-ea"/>
+                <a:cs typeface="+mn-cs"/>
+              </a:defRPr>
+            </a:lvl9pPr>
+          </a:lstStyle>
+          <a:p>
+            <a:pPr indent="-292100">
+              <a:lnSpc>
+                <a:spcPct val="200000"/>
+              </a:lnSpc>
+              <a:spcBef>
+                <a:spcPts val="0"/>
+              </a:spcBef>
+              <a:buSzPts val="1000"/>
+              <a:defRPr sz="1000"/>
+            </a:pPr>
+            <a:r>
+              <a:rPr lang="pt-BR" sz="1000"/>
+              <a:t>Gleick, P.; Iceland, C. Water, Security, and Conflict. Issue Brief. World Resource Institute and Pacific Institute, p. 1–16, ago. 2018.</a:t>
+            </a:r>
+            <a:endParaRPr lang="pt-BR" sz="1200">
+              <a:latin typeface="Times New Roman"/>
+              <a:ea typeface="Times New Roman"/>
+              <a:cs typeface="Times New Roman"/>
+              <a:sym typeface="Times New Roman"/>
+            </a:endParaRPr>
+          </a:p>
+          <a:p>
+            <a:pPr indent="-292100">
+              <a:lnSpc>
+                <a:spcPct val="200000"/>
+              </a:lnSpc>
+              <a:spcBef>
+                <a:spcPts val="0"/>
+              </a:spcBef>
+              <a:buSzPts val="1000"/>
+              <a:defRPr sz="1000"/>
+            </a:pPr>
+            <a:r>
+              <a:rPr lang="pt-BR" sz="1000"/>
+              <a:t>Gomes, D. dos S. Inteligência Artificial: conceitos e aplicações. Olhar Científico. v1, n. 2, p. 234-246, 2010.</a:t>
+            </a:r>
+            <a:endParaRPr lang="pt-BR" sz="1200">
+              <a:latin typeface="Times New Roman"/>
+              <a:ea typeface="Times New Roman"/>
+              <a:cs typeface="Times New Roman"/>
+              <a:sym typeface="Times New Roman"/>
+            </a:endParaRPr>
+          </a:p>
+          <a:p>
+            <a:pPr indent="-292100">
+              <a:lnSpc>
+                <a:spcPct val="200000"/>
+              </a:lnSpc>
+              <a:spcBef>
+                <a:spcPts val="0"/>
+              </a:spcBef>
+              <a:buSzPts val="1000"/>
+              <a:defRPr sz="1000"/>
+            </a:pPr>
+            <a:r>
+              <a:rPr lang="pt-BR" sz="1000"/>
+              <a:t>João, Belmiro do Nascimento; Souza, Crisomar Lobo de; Serralvo, Francisco Antonio. Revisão sistemática de cidades inteligentes e internet das coisas como tópico de pesquisa. Cadernos Ebape. br, v. 17, p. 1115-1130, 2020.</a:t>
+            </a:r>
+            <a:endParaRPr lang="pt-BR" sz="1200">
+              <a:latin typeface="Times New Roman"/>
+              <a:ea typeface="Times New Roman"/>
+              <a:cs typeface="Times New Roman"/>
+              <a:sym typeface="Times New Roman"/>
+            </a:endParaRPr>
+          </a:p>
+          <a:p>
+            <a:pPr indent="-292100">
+              <a:lnSpc>
+                <a:spcPct val="200000"/>
+              </a:lnSpc>
+              <a:spcBef>
+                <a:spcPts val="0"/>
+              </a:spcBef>
+              <a:buSzPts val="1000"/>
+              <a:defRPr sz="1000"/>
+            </a:pPr>
+            <a:r>
+              <a:rPr lang="pt-BR" sz="1000"/>
+              <a:t>Johnsson, Rosa Maria Formiga; Melo, Marilia Carvalho de. O conceito emergente de segurança hídrica. Sustentare, v. 1, n. 1, p. 72-92, 2018.</a:t>
+            </a:r>
+            <a:endParaRPr lang="pt-BR" sz="1200">
+              <a:latin typeface="Times New Roman"/>
+              <a:ea typeface="Times New Roman"/>
+              <a:cs typeface="Times New Roman"/>
+              <a:sym typeface="Times New Roman"/>
+            </a:endParaRPr>
+          </a:p>
+          <a:p>
+            <a:pPr indent="-292100">
+              <a:lnSpc>
+                <a:spcPct val="200000"/>
+              </a:lnSpc>
+              <a:spcBef>
+                <a:spcPts val="0"/>
+              </a:spcBef>
+              <a:buSzPts val="1000"/>
+              <a:defRPr sz="1000"/>
+            </a:pPr>
+            <a:r>
+              <a:rPr lang="pt-BR" sz="1000"/>
+              <a:t>Kaufman, Dora. A inteligência artificial irá suplantar a inteligência humana? ESTAÇÃO DAS LETRAS E CORES EDI, 2019.</a:t>
+            </a:r>
+            <a:endParaRPr lang="pt-BR" sz="1200">
+              <a:latin typeface="Times New Roman"/>
+              <a:ea typeface="Times New Roman"/>
+              <a:cs typeface="Times New Roman"/>
+              <a:sym typeface="Times New Roman"/>
+            </a:endParaRPr>
+          </a:p>
+          <a:p>
+            <a:pPr indent="-292100">
+              <a:lnSpc>
+                <a:spcPct val="200000"/>
+              </a:lnSpc>
+              <a:spcBef>
+                <a:spcPts val="0"/>
+              </a:spcBef>
+              <a:buSzPts val="1000"/>
+              <a:defRPr sz="1000"/>
+            </a:pPr>
+            <a:r>
+              <a:rPr lang="pt-BR" sz="1000"/>
+              <a:t>Kon, Fabio; Santana, Eduardo Felipe Zambom. Cidades Inteligentes: Conceitos, plataformas e desafios. Jornadas de atualização em informática, v. 17, 2016.</a:t>
+            </a:r>
+            <a:endParaRPr lang="pt-BR" sz="1200">
+              <a:latin typeface="Times New Roman"/>
+              <a:ea typeface="Times New Roman"/>
+              <a:cs typeface="Times New Roman"/>
+              <a:sym typeface="Times New Roman"/>
+            </a:endParaRPr>
+          </a:p>
+          <a:p>
+            <a:pPr indent="-292100">
+              <a:lnSpc>
+                <a:spcPct val="200000"/>
+              </a:lnSpc>
+              <a:spcBef>
+                <a:spcPts val="0"/>
+              </a:spcBef>
+              <a:buSzPts val="1000"/>
+              <a:defRPr sz="1000"/>
+            </a:pPr>
+            <a:r>
+              <a:rPr lang="pt-BR" sz="1000"/>
+              <a:t>Krishnamachari, Bhaskar; Power, Jerry; Kim, Seon Ho; Shahabi, Cyrus. I3: An IoT marketplace for smart communities. In: Proceedings of the 16th Annual International Conference on Mobile Systems, Applications, and Services. 2018. p. 498-499. </a:t>
+            </a:r>
+            <a:endParaRPr lang="pt-BR" sz="1200">
+              <a:latin typeface="Times New Roman"/>
+              <a:ea typeface="Times New Roman"/>
+              <a:cs typeface="Times New Roman"/>
+              <a:sym typeface="Times New Roman"/>
+            </a:endParaRPr>
+          </a:p>
+          <a:p>
+            <a:pPr indent="-292100">
+              <a:lnSpc>
+                <a:spcPct val="200000"/>
+              </a:lnSpc>
+              <a:spcBef>
+                <a:spcPts val="0"/>
+              </a:spcBef>
+              <a:buSzPts val="1000"/>
+              <a:defRPr sz="1000"/>
+            </a:pPr>
+            <a:r>
+              <a:rPr lang="pt-BR" sz="1000"/>
+              <a:t>Lemos, André; De que forma as novas tecnologias - como a computação em nuvem, o Big Data e a internet Das coisas - podem melhorar a condição de vida nos espaços urbanos?. Revista GV-EXECUTIVO - Fundação Getúlio Vargas, v. 12 n. 2, 2013.</a:t>
+            </a:r>
+            <a:endParaRPr lang="pt-BR" sz="1200">
+              <a:latin typeface="Times New Roman"/>
+              <a:ea typeface="Times New Roman"/>
+              <a:cs typeface="Times New Roman"/>
+              <a:sym typeface="Times New Roman"/>
+            </a:endParaRPr>
+          </a:p>
+          <a:p>
+            <a:pPr marL="437716" indent="-272616">
+              <a:lnSpc>
+                <a:spcPct val="200000"/>
+              </a:lnSpc>
+              <a:spcBef>
+                <a:spcPts val="0"/>
+              </a:spcBef>
+              <a:buSzPts val="900"/>
+              <a:defRPr sz="1000"/>
+            </a:pPr>
+            <a:r>
+              <a:rPr lang="pt-BR" sz="933">
+                <a:latin typeface="Times New Roman"/>
+                <a:ea typeface="Times New Roman"/>
+                <a:cs typeface="Times New Roman"/>
+                <a:sym typeface="Times New Roman"/>
+              </a:rPr>
+              <a:t> </a:t>
+            </a:r>
+            <a:r>
+              <a:rPr lang="pt-BR" sz="1000"/>
+              <a:t>Nam, T.; Pardo, T.A. Conceptualizing smart city with dimensions of technology, people and institutions. In: ANNUAL INTERNATIONAL CONFERENCE ON DIGITAL, 2011.</a:t>
+            </a:r>
+            <a:endParaRPr lang="pt-BR" sz="1000" dirty="0"/>
+          </a:p>
+        </p:txBody>
+      </p:sp>
+    </p:spTree>
+    <p:extLst>
+      <p:ext uri="{BB962C8B-B14F-4D97-AF65-F5344CB8AC3E}">
+        <p14:creationId xmlns:p14="http://schemas.microsoft.com/office/powerpoint/2010/main" val="2417284442"/>
+      </p:ext>
+    </p:extLst>
+  </p:cSld>
+  <p:clrMapOvr>
+    <a:masterClrMapping/>
+  </p:clrMapOvr>
+</p:sld>
+</file>
+
+<file path=ppt/slides/slide18.xml><?xml version="1.0" encoding="utf-8"?>
+<p:sld xmlns:a="http://schemas.openxmlformats.org/drawingml/2006/main" xmlns:r="http://schemas.openxmlformats.org/officeDocument/2006/relationships" xmlns:p="http://schemas.openxmlformats.org/presentationml/2006/main">
+  <p:cSld>
+    <p:spTree>
+      <p:nvGrpSpPr>
+        <p:cNvPr id="1" name=""/>
+        <p:cNvGrpSpPr/>
+        <p:nvPr/>
+      </p:nvGrpSpPr>
+      <p:grpSpPr>
+        <a:xfrm>
+          <a:off x="0" y="0"/>
+          <a:ext cx="0" cy="0"/>
+          <a:chOff x="0" y="0"/>
+          <a:chExt cx="0" cy="0"/>
+        </a:xfrm>
+      </p:grpSpPr>
+      <p:sp>
+        <p:nvSpPr>
+          <p:cNvPr id="2" name="Retângulo 1">
+            <a:extLst>
+              <a:ext uri="{FF2B5EF4-FFF2-40B4-BE49-F238E27FC236}">
+                <a16:creationId xmlns:a16="http://schemas.microsoft.com/office/drawing/2014/main" id="{EFDCF8C1-F7FD-9B07-1CB0-E5B34451E5E7}"/>
+              </a:ext>
+            </a:extLst>
+          </p:cNvPr>
+          <p:cNvSpPr/>
+          <p:nvPr/>
+        </p:nvSpPr>
+        <p:spPr>
+          <a:xfrm>
+            <a:off x="-1" y="0"/>
+            <a:ext cx="2210937" cy="6858000"/>
+          </a:xfrm>
+          <a:prstGeom prst="rect">
+            <a:avLst/>
+          </a:prstGeom>
+          <a:solidFill>
+            <a:srgbClr val="00D2FF"/>
+          </a:solidFill>
+          <a:ln>
+            <a:noFill/>
+          </a:ln>
+        </p:spPr>
+        <p:style>
+          <a:lnRef idx="2">
+            <a:schemeClr val="accent1">
+              <a:shade val="15000"/>
+            </a:schemeClr>
+          </a:lnRef>
+          <a:fillRef idx="1">
+            <a:schemeClr val="accent1"/>
+          </a:fillRef>
+          <a:effectRef idx="0">
+            <a:schemeClr val="accent1"/>
+          </a:effectRef>
+          <a:fontRef idx="minor">
+            <a:schemeClr val="lt1"/>
+          </a:fontRef>
+        </p:style>
+        <p:txBody>
+          <a:bodyPr rtlCol="0" anchor="ctr"/>
+          <a:lstStyle/>
+          <a:p>
+            <a:pPr algn="ctr"/>
+            <a:endParaRPr lang="pt-BR"/>
+          </a:p>
+        </p:txBody>
+      </p:sp>
+      <p:pic>
+        <p:nvPicPr>
+          <p:cNvPr id="6" name="Imagem 5" descr="Texto&#10;&#10;Descrição gerada automaticamente">
+            <a:extLst>
+              <a:ext uri="{FF2B5EF4-FFF2-40B4-BE49-F238E27FC236}">
+                <a16:creationId xmlns:a16="http://schemas.microsoft.com/office/drawing/2014/main" id="{2EC604D7-826E-A83D-917E-9E7697BB5ADA}"/>
+              </a:ext>
+            </a:extLst>
+          </p:cNvPr>
+          <p:cNvPicPr>
+            <a:picLocks noChangeAspect="1"/>
+          </p:cNvPicPr>
+          <p:nvPr/>
+        </p:nvPicPr>
+        <p:blipFill>
+          <a:blip r:embed="rId2">
+            <a:extLst>
+              <a:ext uri="{28A0092B-C50C-407E-A947-70E740481C1C}">
+                <a14:useLocalDpi xmlns:a14="http://schemas.microsoft.com/office/drawing/2010/main" val="0"/>
+              </a:ext>
+            </a:extLst>
+          </a:blip>
+          <a:stretch>
+            <a:fillRect/>
+          </a:stretch>
+        </p:blipFill>
+        <p:spPr>
+          <a:xfrm>
+            <a:off x="83270" y="5904336"/>
+            <a:ext cx="2044393" cy="727665"/>
+          </a:xfrm>
+          <a:prstGeom prst="rect">
+            <a:avLst/>
+          </a:prstGeom>
+        </p:spPr>
+      </p:pic>
+      <p:pic>
+        <p:nvPicPr>
+          <p:cNvPr id="7" name="Imagem 6" descr="Uma imagem contendo Ícone&#10;&#10;Descrição gerada automaticamente">
+            <a:extLst>
+              <a:ext uri="{FF2B5EF4-FFF2-40B4-BE49-F238E27FC236}">
+                <a16:creationId xmlns:a16="http://schemas.microsoft.com/office/drawing/2014/main" id="{D6ED7EEC-5B13-5632-5EB0-A2E0B64EDCBB}"/>
+              </a:ext>
+            </a:extLst>
+          </p:cNvPr>
+          <p:cNvPicPr>
+            <a:picLocks noChangeAspect="1"/>
+          </p:cNvPicPr>
+          <p:nvPr/>
+        </p:nvPicPr>
+        <p:blipFill>
+          <a:blip r:embed="rId3">
+            <a:extLst>
+              <a:ext uri="{28A0092B-C50C-407E-A947-70E740481C1C}">
+                <a14:useLocalDpi xmlns:a14="http://schemas.microsoft.com/office/drawing/2010/main" val="0"/>
+              </a:ext>
+            </a:extLst>
+          </a:blip>
+          <a:stretch>
+            <a:fillRect/>
+          </a:stretch>
+        </p:blipFill>
+        <p:spPr>
+          <a:xfrm rot="16200000">
+            <a:off x="-1249467" y="2954703"/>
+            <a:ext cx="4709865" cy="737403"/>
+          </a:xfrm>
+          <a:prstGeom prst="rect">
+            <a:avLst/>
+          </a:prstGeom>
+        </p:spPr>
+      </p:pic>
+      <p:pic>
+        <p:nvPicPr>
+          <p:cNvPr id="8" name="Imagem 7" descr="Logotipo, nome da empresa&#10;&#10;Descrição gerada automaticamente">
+            <a:extLst>
+              <a:ext uri="{FF2B5EF4-FFF2-40B4-BE49-F238E27FC236}">
+                <a16:creationId xmlns:a16="http://schemas.microsoft.com/office/drawing/2014/main" id="{3AACE306-0BB8-55D1-9737-454B7AFFF728}"/>
+              </a:ext>
+            </a:extLst>
+          </p:cNvPr>
+          <p:cNvPicPr>
+            <a:picLocks noChangeAspect="1"/>
+          </p:cNvPicPr>
+          <p:nvPr/>
+        </p:nvPicPr>
+        <p:blipFill>
+          <a:blip r:embed="rId4">
+            <a:extLst>
+              <a:ext uri="{28A0092B-C50C-407E-A947-70E740481C1C}">
+                <a14:useLocalDpi xmlns:a14="http://schemas.microsoft.com/office/drawing/2010/main" val="0"/>
+              </a:ext>
+            </a:extLst>
+          </a:blip>
+          <a:stretch>
+            <a:fillRect/>
+          </a:stretch>
+        </p:blipFill>
+        <p:spPr>
+          <a:xfrm>
+            <a:off x="375952" y="0"/>
+            <a:ext cx="1459026" cy="965304"/>
+          </a:xfrm>
+          <a:prstGeom prst="rect">
+            <a:avLst/>
+          </a:prstGeom>
+        </p:spPr>
+      </p:pic>
+      <p:sp>
+        <p:nvSpPr>
+          <p:cNvPr id="3" name="Google Shape;207;g16475793bdd_0_87">
+            <a:extLst>
+              <a:ext uri="{FF2B5EF4-FFF2-40B4-BE49-F238E27FC236}">
+                <a16:creationId xmlns:a16="http://schemas.microsoft.com/office/drawing/2014/main" id="{44D578C5-6F64-624F-66F3-00C638634CC4}"/>
+              </a:ext>
+            </a:extLst>
+          </p:cNvPr>
+          <p:cNvSpPr txBox="1">
+            <a:spLocks noGrp="1"/>
+          </p:cNvSpPr>
+          <p:nvPr>
+            <p:ph type="title"/>
+          </p:nvPr>
+        </p:nvSpPr>
+        <p:spPr>
+          <a:xfrm>
+            <a:off x="2976476" y="523750"/>
+            <a:ext cx="8780700" cy="1325700"/>
+          </a:xfrm>
+          <a:prstGeom prst="rect">
+            <a:avLst/>
+          </a:prstGeom>
+        </p:spPr>
+        <p:txBody>
+          <a:bodyPr/>
+          <a:lstStyle/>
+          <a:p>
+            <a:r>
+              <a:rPr dirty="0" err="1"/>
+              <a:t>Referências</a:t>
+            </a:r>
+            <a:endParaRPr dirty="0"/>
+          </a:p>
+        </p:txBody>
+      </p:sp>
+      <p:sp>
+        <p:nvSpPr>
           <p:cNvPr id="4" name="Google Shape;220;g16475793bdd_0_152">
             <a:extLst>
               <a:ext uri="{FF2B5EF4-FFF2-40B4-BE49-F238E27FC236}">
@@ -8277,7 +8625,7 @@
 </p:sld>
 </file>
 
-<file path=ppt/slides/slide18.xml><?xml version="1.0" encoding="utf-8"?>
+<file path=ppt/slides/slide19.xml><?xml version="1.0" encoding="utf-8"?>
 <p:sld xmlns:a="http://schemas.openxmlformats.org/drawingml/2006/main" xmlns:r="http://schemas.openxmlformats.org/officeDocument/2006/relationships" xmlns:p="http://schemas.openxmlformats.org/presentationml/2006/main">
   <p:cSld>
     <p:spTree>
@@ -8746,7 +9094,7 @@
           </a:ln>
           <a:extLst>
             <a:ext uri="{C572A759-6A51-4108-AA02-DFA0A04FC94B}">
-              <ma14:wrappingTextBoxFlag xmlns:ma14="http://schemas.microsoft.com/office/mac/drawingml/2011/main" xmlns:a14="http://schemas.microsoft.com/office/drawing/2010/main" xmlns:m="http://schemas.openxmlformats.org/officeDocument/2006/math" xmlns="" val="1"/>
+              <ma14:wrappingTextBoxFlag xmlns="" xmlns:m="http://schemas.openxmlformats.org/officeDocument/2006/math" xmlns:a14="http://schemas.microsoft.com/office/drawing/2010/main" xmlns:ma14="http://schemas.microsoft.com/office/mac/drawingml/2011/main" val="1"/>
             </a:ext>
           </a:extLst>
         </p:spPr>
@@ -8951,7 +9299,7 @@
           </a:ln>
           <a:extLst>
             <a:ext uri="{C572A759-6A51-4108-AA02-DFA0A04FC94B}">
-              <ma14:wrappingTextBoxFlag xmlns:ma14="http://schemas.microsoft.com/office/mac/drawingml/2011/main" xmlns:a14="http://schemas.microsoft.com/office/drawing/2010/main" xmlns:m="http://schemas.openxmlformats.org/officeDocument/2006/math" xmlns="" val="1"/>
+              <ma14:wrappingTextBoxFlag xmlns="" xmlns:m="http://schemas.openxmlformats.org/officeDocument/2006/math" xmlns:a14="http://schemas.microsoft.com/office/drawing/2010/main" xmlns:ma14="http://schemas.microsoft.com/office/mac/drawingml/2011/main" val="1"/>
             </a:ext>
           </a:extLst>
         </p:spPr>

</xml_diff>